<commit_message>
Project 3 HTML updates
</commit_message>
<xml_diff>
--- a/Project_3.pptx
+++ b/Project_3.pptx
@@ -5,14 +5,15 @@
     <p:sldMasterId id="2147483648" r:id="rId1"/>
   </p:sldMasterIdLst>
   <p:notesMasterIdLst>
-    <p:notesMasterId r:id="rId7"/>
+    <p:notesMasterId r:id="rId8"/>
   </p:notesMasterIdLst>
   <p:sldIdLst>
     <p:sldId id="256" r:id="rId2"/>
     <p:sldId id="257" r:id="rId3"/>
     <p:sldId id="259" r:id="rId4"/>
-    <p:sldId id="261" r:id="rId5"/>
-    <p:sldId id="258" r:id="rId6"/>
+    <p:sldId id="262" r:id="rId5"/>
+    <p:sldId id="261" r:id="rId6"/>
+    <p:sldId id="258" r:id="rId7"/>
   </p:sldIdLst>
   <p:sldSz cx="12192000" cy="6858000"/>
   <p:notesSz cx="6858000" cy="9144000"/>
@@ -201,7 +202,7 @@
           <a:p>
             <a:fld id="{D787FA33-36A0-4BA6-AA24-14202E5CC49F}" type="datetimeFigureOut">
               <a:rPr lang="en-US" smtClean="0"/>
-              <a:t>10/10/20</a:t>
+              <a:t>10/11/2020</a:t>
             </a:fld>
             <a:endParaRPr lang="en-US"/>
           </a:p>
@@ -794,7 +795,7 @@
     </p:spTree>
     <p:extLst>
       <p:ext uri="{BB962C8B-B14F-4D97-AF65-F5344CB8AC3E}">
-        <p14:creationId xmlns:p14="http://schemas.microsoft.com/office/powerpoint/2010/main" val="4162090472"/>
+        <p14:creationId xmlns:p14="http://schemas.microsoft.com/office/powerpoint/2010/main" val="3322918643"/>
       </p:ext>
     </p:extLst>
   </p:cSld>
@@ -870,6 +871,90 @@
             <a:fld id="{00CD4E95-15EC-4946-8EB1-8EEE30E889E3}" type="slidenum">
               <a:rPr lang="en-US" smtClean="0"/>
               <a:t>5</a:t>
+            </a:fld>
+            <a:endParaRPr lang="en-US"/>
+          </a:p>
+        </p:txBody>
+      </p:sp>
+    </p:spTree>
+    <p:extLst>
+      <p:ext uri="{BB962C8B-B14F-4D97-AF65-F5344CB8AC3E}">
+        <p14:creationId xmlns:p14="http://schemas.microsoft.com/office/powerpoint/2010/main" val="4162090472"/>
+      </p:ext>
+    </p:extLst>
+  </p:cSld>
+  <p:clrMapOvr>
+    <a:masterClrMapping/>
+  </p:clrMapOvr>
+</p:notes>
+</file>
+
+<file path=ppt/notesSlides/notesSlide6.xml><?xml version="1.0" encoding="utf-8"?>
+<p:notes xmlns:a="http://schemas.openxmlformats.org/drawingml/2006/main" xmlns:r="http://schemas.openxmlformats.org/officeDocument/2006/relationships" xmlns:p="http://schemas.openxmlformats.org/presentationml/2006/main">
+  <p:cSld>
+    <p:spTree>
+      <p:nvGrpSpPr>
+        <p:cNvPr id="1" name=""/>
+        <p:cNvGrpSpPr/>
+        <p:nvPr/>
+      </p:nvGrpSpPr>
+      <p:grpSpPr>
+        <a:xfrm>
+          <a:off x="0" y="0"/>
+          <a:ext cx="0" cy="0"/>
+          <a:chOff x="0" y="0"/>
+          <a:chExt cx="0" cy="0"/>
+        </a:xfrm>
+      </p:grpSpPr>
+      <p:sp>
+        <p:nvSpPr>
+          <p:cNvPr id="2" name="Slide Image Placeholder 1"/>
+          <p:cNvSpPr>
+            <a:spLocks noGrp="1" noRot="1" noChangeAspect="1"/>
+          </p:cNvSpPr>
+          <p:nvPr>
+            <p:ph type="sldImg"/>
+          </p:nvPr>
+        </p:nvSpPr>
+        <p:spPr/>
+      </p:sp>
+      <p:sp>
+        <p:nvSpPr>
+          <p:cNvPr id="3" name="Notes Placeholder 2"/>
+          <p:cNvSpPr>
+            <a:spLocks noGrp="1"/>
+          </p:cNvSpPr>
+          <p:nvPr>
+            <p:ph type="body" idx="1"/>
+          </p:nvPr>
+        </p:nvSpPr>
+        <p:spPr/>
+        <p:txBody>
+          <a:bodyPr/>
+          <a:lstStyle/>
+          <a:p>
+            <a:endParaRPr lang="en-US" dirty="0"/>
+          </a:p>
+        </p:txBody>
+      </p:sp>
+      <p:sp>
+        <p:nvSpPr>
+          <p:cNvPr id="4" name="Slide Number Placeholder 3"/>
+          <p:cNvSpPr>
+            <a:spLocks noGrp="1"/>
+          </p:cNvSpPr>
+          <p:nvPr>
+            <p:ph type="sldNum" sz="quarter" idx="5"/>
+          </p:nvPr>
+        </p:nvSpPr>
+        <p:spPr/>
+        <p:txBody>
+          <a:bodyPr/>
+          <a:lstStyle/>
+          <a:p>
+            <a:fld id="{00CD4E95-15EC-4946-8EB1-8EEE30E889E3}" type="slidenum">
+              <a:rPr lang="en-US" smtClean="0"/>
+              <a:t>6</a:t>
             </a:fld>
             <a:endParaRPr lang="en-US"/>
           </a:p>
@@ -1035,7 +1120,7 @@
           <a:p>
             <a:fld id="{76390919-E38A-43AC-80A0-C781043285AC}" type="datetimeFigureOut">
               <a:rPr lang="en-US" smtClean="0"/>
-              <a:t>10/10/20</a:t>
+              <a:t>10/11/2020</a:t>
             </a:fld>
             <a:endParaRPr lang="en-US"/>
           </a:p>
@@ -1233,7 +1318,7 @@
           <a:p>
             <a:fld id="{76390919-E38A-43AC-80A0-C781043285AC}" type="datetimeFigureOut">
               <a:rPr lang="en-US" smtClean="0"/>
-              <a:t>10/10/20</a:t>
+              <a:t>10/11/2020</a:t>
             </a:fld>
             <a:endParaRPr lang="en-US"/>
           </a:p>
@@ -1441,7 +1526,7 @@
           <a:p>
             <a:fld id="{76390919-E38A-43AC-80A0-C781043285AC}" type="datetimeFigureOut">
               <a:rPr lang="en-US" smtClean="0"/>
-              <a:t>10/10/20</a:t>
+              <a:t>10/11/2020</a:t>
             </a:fld>
             <a:endParaRPr lang="en-US"/>
           </a:p>
@@ -1639,7 +1724,7 @@
           <a:p>
             <a:fld id="{76390919-E38A-43AC-80A0-C781043285AC}" type="datetimeFigureOut">
               <a:rPr lang="en-US" smtClean="0"/>
-              <a:t>10/10/20</a:t>
+              <a:t>10/11/2020</a:t>
             </a:fld>
             <a:endParaRPr lang="en-US"/>
           </a:p>
@@ -1914,7 +1999,7 @@
           <a:p>
             <a:fld id="{76390919-E38A-43AC-80A0-C781043285AC}" type="datetimeFigureOut">
               <a:rPr lang="en-US" smtClean="0"/>
-              <a:t>10/10/20</a:t>
+              <a:t>10/11/2020</a:t>
             </a:fld>
             <a:endParaRPr lang="en-US"/>
           </a:p>
@@ -2179,7 +2264,7 @@
           <a:p>
             <a:fld id="{76390919-E38A-43AC-80A0-C781043285AC}" type="datetimeFigureOut">
               <a:rPr lang="en-US" smtClean="0"/>
-              <a:t>10/10/20</a:t>
+              <a:t>10/11/2020</a:t>
             </a:fld>
             <a:endParaRPr lang="en-US"/>
           </a:p>
@@ -2591,7 +2676,7 @@
           <a:p>
             <a:fld id="{76390919-E38A-43AC-80A0-C781043285AC}" type="datetimeFigureOut">
               <a:rPr lang="en-US" smtClean="0"/>
-              <a:t>10/10/20</a:t>
+              <a:t>10/11/2020</a:t>
             </a:fld>
             <a:endParaRPr lang="en-US"/>
           </a:p>
@@ -2732,7 +2817,7 @@
           <a:p>
             <a:fld id="{76390919-E38A-43AC-80A0-C781043285AC}" type="datetimeFigureOut">
               <a:rPr lang="en-US" smtClean="0"/>
-              <a:t>10/10/20</a:t>
+              <a:t>10/11/2020</a:t>
             </a:fld>
             <a:endParaRPr lang="en-US"/>
           </a:p>
@@ -2845,7 +2930,7 @@
           <a:p>
             <a:fld id="{76390919-E38A-43AC-80A0-C781043285AC}" type="datetimeFigureOut">
               <a:rPr lang="en-US" smtClean="0"/>
-              <a:t>10/10/20</a:t>
+              <a:t>10/11/2020</a:t>
             </a:fld>
             <a:endParaRPr lang="en-US"/>
           </a:p>
@@ -3156,7 +3241,7 @@
           <a:p>
             <a:fld id="{76390919-E38A-43AC-80A0-C781043285AC}" type="datetimeFigureOut">
               <a:rPr lang="en-US" smtClean="0"/>
-              <a:t>10/10/20</a:t>
+              <a:t>10/11/2020</a:t>
             </a:fld>
             <a:endParaRPr lang="en-US"/>
           </a:p>
@@ -3444,7 +3529,7 @@
           <a:p>
             <a:fld id="{76390919-E38A-43AC-80A0-C781043285AC}" type="datetimeFigureOut">
               <a:rPr lang="en-US" smtClean="0"/>
-              <a:t>10/10/20</a:t>
+              <a:t>10/11/2020</a:t>
             </a:fld>
             <a:endParaRPr lang="en-US"/>
           </a:p>
@@ -3685,7 +3770,7 @@
           <a:p>
             <a:fld id="{76390919-E38A-43AC-80A0-C781043285AC}" type="datetimeFigureOut">
               <a:rPr lang="en-US" smtClean="0"/>
-              <a:t>10/10/20</a:t>
+              <a:t>10/11/2020</a:t>
             </a:fld>
             <a:endParaRPr lang="en-US"/>
           </a:p>
@@ -5359,7 +5444,7 @@
                 <a:latin typeface="Lucida Sans Unicode" panose="020B0602030504020204" pitchFamily="34" charset="0"/>
                 <a:cs typeface="Lucida Sans Unicode" panose="020B0602030504020204" pitchFamily="34" charset="0"/>
               </a:rPr>
-              <a:t>Visualizations</a:t>
+              <a:t>Languages and Technologies used</a:t>
             </a:r>
           </a:p>
         </p:txBody>
@@ -5392,159 +5477,13 @@
           </a:bodyPr>
           <a:lstStyle/>
           <a:p>
-            <a:pPr>
-              <a:spcBef>
-                <a:spcPts val="0"/>
-              </a:spcBef>
-            </a:pPr>
-            <a:r>
-              <a:rPr lang="en-US" sz="1100" dirty="0">
-                <a:cs typeface="Lucida Sans Unicode" panose="020B0602030504020204" pitchFamily="34" charset="0"/>
-              </a:rPr>
-              <a:t>Attribute popularity by year – Using Tableau YOY</a:t>
-            </a:r>
-          </a:p>
-          <a:p>
-            <a:pPr>
-              <a:spcBef>
-                <a:spcPts val="0"/>
-              </a:spcBef>
-            </a:pPr>
-            <a:r>
-              <a:rPr lang="en-US" sz="1100" dirty="0">
-                <a:cs typeface="Lucida Sans Unicode" panose="020B0602030504020204" pitchFamily="34" charset="0"/>
-              </a:rPr>
-              <a:t>Artist in top 100 – Using Tableau with potential user input as filter</a:t>
-            </a:r>
-          </a:p>
-          <a:p>
-            <a:pPr>
-              <a:spcBef>
-                <a:spcPts val="0"/>
-              </a:spcBef>
-            </a:pPr>
-            <a:r>
-              <a:rPr lang="en-US" sz="1100" dirty="0">
-                <a:cs typeface="Lucida Sans Unicode" panose="020B0602030504020204" pitchFamily="34" charset="0"/>
-              </a:rPr>
-              <a:t>Release date 100 &amp; 3</a:t>
-            </a:r>
-          </a:p>
-          <a:p>
-            <a:pPr>
-              <a:spcBef>
-                <a:spcPts val="0"/>
-              </a:spcBef>
-            </a:pPr>
-            <a:r>
-              <a:rPr lang="en-US" sz="1100" dirty="0">
-                <a:cs typeface="Lucida Sans Unicode" panose="020B0602030504020204" pitchFamily="34" charset="0"/>
-              </a:rPr>
-              <a:t>Attributes by song</a:t>
-            </a:r>
-          </a:p>
-          <a:p>
-            <a:pPr>
-              <a:spcBef>
-                <a:spcPts val="0"/>
-              </a:spcBef>
-            </a:pPr>
-            <a:r>
-              <a:rPr lang="en-US" sz="1100" dirty="0">
-                <a:cs typeface="Lucida Sans Unicode" panose="020B0602030504020204" pitchFamily="34" charset="0"/>
-              </a:rPr>
-              <a:t>Attributes by artist</a:t>
-            </a:r>
-          </a:p>
-          <a:p>
-            <a:pPr>
-              <a:spcBef>
-                <a:spcPts val="0"/>
-              </a:spcBef>
-            </a:pPr>
-            <a:r>
-              <a:rPr lang="en-US" sz="1100" dirty="0">
-                <a:cs typeface="Lucida Sans Unicode" panose="020B0602030504020204" pitchFamily="34" charset="0"/>
-              </a:rPr>
-              <a:t>Attribute </a:t>
-            </a:r>
-            <a:r>
-              <a:rPr lang="en-US" sz="1100" dirty="0" err="1">
-                <a:cs typeface="Lucida Sans Unicode" panose="020B0602030504020204" pitchFamily="34" charset="0"/>
-              </a:rPr>
-              <a:t>D3</a:t>
-            </a:r>
-            <a:r>
-              <a:rPr lang="en-US" sz="1100" dirty="0">
-                <a:cs typeface="Lucida Sans Unicode" panose="020B0602030504020204" pitchFamily="34" charset="0"/>
-              </a:rPr>
-              <a:t> (Dual axis using </a:t>
-            </a:r>
-            <a:r>
-              <a:rPr lang="en-US" sz="1100" dirty="0">
-                <a:solidFill>
-                  <a:srgbClr val="00B050"/>
-                </a:solidFill>
-              </a:rPr>
-              <a:t>JavaScript D3.js</a:t>
-            </a:r>
-            <a:r>
-              <a:rPr lang="en-US" sz="1100" dirty="0">
-                <a:cs typeface="Lucida Sans Unicode" panose="020B0602030504020204" pitchFamily="34" charset="0"/>
-              </a:rPr>
-              <a:t>)</a:t>
-            </a:r>
-          </a:p>
-          <a:p>
-            <a:pPr>
-              <a:spcBef>
-                <a:spcPts val="0"/>
-              </a:spcBef>
-            </a:pPr>
-            <a:r>
-              <a:rPr lang="en-US" sz="1100" dirty="0">
-                <a:cs typeface="Lucida Sans Unicode" panose="020B0602030504020204" pitchFamily="34" charset="0"/>
-              </a:rPr>
-              <a:t>ML for Top hit prediction</a:t>
-            </a:r>
-          </a:p>
-          <a:p>
-            <a:pPr>
-              <a:spcBef>
-                <a:spcPts val="0"/>
-              </a:spcBef>
-            </a:pPr>
-            <a:endParaRPr lang="en-US" sz="1100" dirty="0">
-              <a:cs typeface="Lucida Sans Unicode" panose="020B0602030504020204" pitchFamily="34" charset="0"/>
-            </a:endParaRPr>
-          </a:p>
-          <a:p>
-            <a:pPr>
-              <a:spcBef>
-                <a:spcPts val="0"/>
-              </a:spcBef>
-            </a:pPr>
-            <a:r>
-              <a:rPr lang="en-US" sz="1100" b="1" dirty="0">
-                <a:cs typeface="Lucida Sans Unicode" panose="020B0602030504020204" pitchFamily="34" charset="0"/>
-              </a:rPr>
-              <a:t>Languages and Technologies used</a:t>
-            </a:r>
-            <a:r>
-              <a:rPr lang="en-US" sz="1100" dirty="0">
-                <a:cs typeface="Lucida Sans Unicode" panose="020B0602030504020204" pitchFamily="34" charset="0"/>
-              </a:rPr>
-              <a:t>:</a:t>
-            </a:r>
-          </a:p>
-          <a:p>
             <a:pPr fontAlgn="t">
               <a:spcBef>
                 <a:spcPts val="0"/>
               </a:spcBef>
             </a:pPr>
             <a:r>
-              <a:rPr lang="en-US" sz="1100" dirty="0">
+              <a:rPr lang="en-US" sz="2900" dirty="0">
                 <a:solidFill>
                   <a:srgbClr val="00B050"/>
                 </a:solidFill>
@@ -5559,13 +5498,16 @@
               </a:spcBef>
             </a:pPr>
             <a:r>
-              <a:rPr lang="en-US" sz="1100" dirty="0">
+              <a:rPr lang="en-US" sz="2900" dirty="0">
                 <a:solidFill>
-                  <a:srgbClr val="00B050"/>
+                  <a:srgbClr val="FFC000"/>
                 </a:solidFill>
               </a:rPr>
-              <a:t>Python Pandas</a:t>
-            </a:r>
+              <a:t>Amazon AWS</a:t>
+            </a:r>
+            <a:endParaRPr lang="en-US" sz="2900" dirty="0">
+              <a:cs typeface="Lucida Sans Unicode" panose="020B0602030504020204" pitchFamily="34" charset="0"/>
+            </a:endParaRPr>
           </a:p>
           <a:p>
             <a:pPr fontAlgn="t">
@@ -5574,12 +5516,12 @@
               </a:spcBef>
             </a:pPr>
             <a:r>
-              <a:rPr lang="en-US" sz="1100" dirty="0">
+              <a:rPr lang="en-US" sz="2900" dirty="0">
                 <a:solidFill>
                   <a:srgbClr val="00B050"/>
                 </a:solidFill>
               </a:rPr>
-              <a:t>HTML/CSS/Bootstrap</a:t>
+              <a:t>Python Pandas</a:t>
             </a:r>
           </a:p>
           <a:p>
@@ -5589,12 +5531,12 @@
               </a:spcBef>
             </a:pPr>
             <a:r>
-              <a:rPr lang="en-US" sz="1100" dirty="0">
+              <a:rPr lang="en-US" sz="2900" dirty="0">
                 <a:solidFill>
                   <a:srgbClr val="00B050"/>
                 </a:solidFill>
               </a:rPr>
-              <a:t>JavaScript Plotly</a:t>
+              <a:t>HTML/CSS/Bootstrap</a:t>
             </a:r>
           </a:p>
           <a:p>
@@ -5604,12 +5546,12 @@
               </a:spcBef>
             </a:pPr>
             <a:r>
-              <a:rPr lang="en-US" sz="1100" dirty="0">
+              <a:rPr lang="en-US" sz="2900" dirty="0">
                 <a:solidFill>
                   <a:srgbClr val="00B050"/>
                 </a:solidFill>
               </a:rPr>
-              <a:t>JavaScript D3.js</a:t>
+              <a:t>JavaScript Plotly</a:t>
             </a:r>
           </a:p>
           <a:p>
@@ -5619,12 +5561,12 @@
               </a:spcBef>
             </a:pPr>
             <a:r>
-              <a:rPr lang="en-US" sz="1100" dirty="0">
+              <a:rPr lang="en-US" sz="2900" dirty="0">
                 <a:solidFill>
                   <a:srgbClr val="00B050"/>
                 </a:solidFill>
               </a:rPr>
-              <a:t>SQL Database</a:t>
+              <a:t>JavaScript D3.js</a:t>
             </a:r>
           </a:p>
           <a:p>
@@ -5634,12 +5576,12 @@
               </a:spcBef>
             </a:pPr>
             <a:r>
-              <a:rPr lang="en-US" sz="1100" dirty="0">
+              <a:rPr lang="en-US" sz="2900" dirty="0">
                 <a:solidFill>
                   <a:srgbClr val="00B050"/>
                 </a:solidFill>
               </a:rPr>
-              <a:t>Google Cloud SQL</a:t>
+              <a:t>SQL Database</a:t>
             </a:r>
           </a:p>
           <a:p>
@@ -5649,7 +5591,7 @@
               </a:spcBef>
             </a:pPr>
             <a:r>
-              <a:rPr lang="en-US" sz="1100" dirty="0">
+              <a:rPr lang="en-US" sz="2900" dirty="0">
                 <a:solidFill>
                   <a:srgbClr val="00B050"/>
                 </a:solidFill>
@@ -5663,22 +5605,11 @@
                 <a:spcPts val="0"/>
               </a:spcBef>
             </a:pPr>
-            <a:r>
-              <a:rPr lang="en-US" sz="1100" dirty="0" err="1">
-                <a:solidFill>
-                  <a:srgbClr val="00B050"/>
-                </a:solidFill>
-              </a:rPr>
-              <a:t>Scikit</a:t>
-            </a:r>
-            <a:r>
-              <a:rPr lang="en-US" sz="1100" dirty="0">
-                <a:solidFill>
-                  <a:srgbClr val="00B050"/>
-                </a:solidFill>
-              </a:rPr>
-              <a:t>-Learn</a:t>
-            </a:r>
+            <a:endParaRPr lang="en-US" sz="2900" dirty="0">
+              <a:solidFill>
+                <a:srgbClr val="00B050"/>
+              </a:solidFill>
+            </a:endParaRPr>
           </a:p>
           <a:p>
             <a:pPr fontAlgn="t">
@@ -5687,96 +5618,12 @@
               </a:spcBef>
             </a:pPr>
             <a:r>
-              <a:rPr lang="en-US" sz="1100" dirty="0">
+              <a:rPr lang="en-US" sz="2900" dirty="0">
                 <a:solidFill>
-                  <a:srgbClr val="FFC000"/>
+                  <a:srgbClr val="00B050"/>
                 </a:solidFill>
               </a:rPr>
-              <a:t>Amazon AWS</a:t>
-            </a:r>
-          </a:p>
-          <a:p>
-            <a:pPr fontAlgn="t">
-              <a:spcBef>
-                <a:spcPts val="0"/>
-              </a:spcBef>
-            </a:pPr>
-            <a:r>
-              <a:rPr lang="en-US" sz="1100" dirty="0">
-                <a:solidFill>
-                  <a:srgbClr val="FF0000"/>
-                </a:solidFill>
-              </a:rPr>
-              <a:t>Python Matplotlib</a:t>
-            </a:r>
-          </a:p>
-          <a:p>
-            <a:pPr fontAlgn="t">
-              <a:spcBef>
-                <a:spcPts val="0"/>
-              </a:spcBef>
-            </a:pPr>
-            <a:r>
-              <a:rPr lang="en-US" sz="1100" dirty="0">
-                <a:solidFill>
-                  <a:srgbClr val="FF0000"/>
-                </a:solidFill>
-              </a:rPr>
-              <a:t>MongoDB Database</a:t>
-            </a:r>
-          </a:p>
-          <a:p>
-            <a:pPr fontAlgn="t">
-              <a:spcBef>
-                <a:spcPts val="0"/>
-              </a:spcBef>
-            </a:pPr>
-            <a:r>
-              <a:rPr lang="en-US" sz="1100" dirty="0">
-                <a:solidFill>
-                  <a:srgbClr val="FF0000"/>
-                </a:solidFill>
-              </a:rPr>
-              <a:t>JavaScript Leaflet</a:t>
-            </a:r>
-          </a:p>
-          <a:p>
-            <a:pPr fontAlgn="t">
-              <a:spcBef>
-                <a:spcPts val="0"/>
-              </a:spcBef>
-            </a:pPr>
-            <a:endParaRPr lang="en-US" sz="1100" dirty="0">
-              <a:solidFill>
-                <a:srgbClr val="FF0000"/>
-              </a:solidFill>
-              <a:cs typeface="Lucida Sans Unicode" panose="020B0602030504020204" pitchFamily="34" charset="0"/>
-            </a:endParaRPr>
-          </a:p>
-          <a:p>
-            <a:pPr fontAlgn="t">
-              <a:spcBef>
-                <a:spcPts val="0"/>
-              </a:spcBef>
-            </a:pPr>
-            <a:r>
-              <a:rPr lang="en-US" sz="1100" dirty="0">
-                <a:cs typeface="Lucida Sans Unicode" panose="020B0602030504020204" pitchFamily="34" charset="0"/>
-              </a:rPr>
-              <a:t>Prepare a 15-minute data deep-dive or infrastructure walkthrough that shows machine learning in the context of what we’ve already learned.</a:t>
-            </a:r>
-          </a:p>
-          <a:p>
-            <a:pPr fontAlgn="t">
-              <a:spcBef>
-                <a:spcPts val="0"/>
-              </a:spcBef>
-            </a:pPr>
-            <a:r>
-              <a:rPr lang="en-US" sz="1100" dirty="0">
-                <a:cs typeface="Lucida Sans Unicode" panose="020B0602030504020204" pitchFamily="34" charset="0"/>
-              </a:rPr>
-              <a:t>Example projects:</a:t>
+              <a:t>MACHINE LEARNING:</a:t>
             </a:r>
           </a:p>
           <a:p>
@@ -5786,10 +5633,12 @@
               </a:spcBef>
             </a:pPr>
             <a:r>
-              <a:rPr lang="en-US" sz="1100" dirty="0">
-                <a:cs typeface="Lucida Sans Unicode" panose="020B0602030504020204" pitchFamily="34" charset="0"/>
-              </a:rPr>
-              <a:t>Create a front-end interface that maps to an API to “smarten” the algorithm.</a:t>
+              <a:rPr lang="en-US" sz="2500" dirty="0">
+                <a:solidFill>
+                  <a:srgbClr val="00B050"/>
+                </a:solidFill>
+              </a:rPr>
+              <a:t>Google Cloud SQL</a:t>
             </a:r>
           </a:p>
           <a:p>
@@ -5799,73 +5648,20 @@
               </a:spcBef>
             </a:pPr>
             <a:r>
-              <a:rPr lang="en-US" sz="1100" dirty="0">
-                <a:cs typeface="Lucida Sans Unicode" panose="020B0602030504020204" pitchFamily="34" charset="0"/>
-              </a:rPr>
-              <a:t>Perform a deep dive of existing data using machine learning.</a:t>
-            </a:r>
-          </a:p>
-          <a:p>
-            <a:pPr lvl="1" fontAlgn="t">
-              <a:spcBef>
-                <a:spcPts val="0"/>
-              </a:spcBef>
-            </a:pPr>
-            <a:r>
-              <a:rPr lang="en-US" sz="1100" dirty="0">
-                <a:cs typeface="Lucida Sans Unicode" panose="020B0602030504020204" pitchFamily="34" charset="0"/>
-              </a:rPr>
-              <a:t>Create a visualization that continues to learn where clusters lie based on ML</a:t>
-            </a:r>
-            <a:r>
-              <a:rPr lang="en-US" sz="1100">
-                <a:cs typeface="Lucida Sans Unicode" panose="020B0602030504020204" pitchFamily="34" charset="0"/>
-              </a:rPr>
-              <a:t>. (</a:t>
-            </a:r>
-            <a:r>
-              <a:rPr lang="en-US" sz="1100" dirty="0">
-                <a:cs typeface="Lucida Sans Unicode" panose="020B0602030504020204" pitchFamily="34" charset="0"/>
-              </a:rPr>
-              <a:t>Use </a:t>
-            </a:r>
-            <a:r>
-              <a:rPr lang="en-US" sz="1100" dirty="0" err="1">
-                <a:cs typeface="Lucida Sans Unicode" panose="020B0602030504020204" pitchFamily="34" charset="0"/>
-              </a:rPr>
-              <a:t>D3</a:t>
-            </a:r>
-            <a:r>
-              <a:rPr lang="en-US" sz="1100" dirty="0">
-                <a:cs typeface="Lucida Sans Unicode" panose="020B0602030504020204" pitchFamily="34" charset="0"/>
-              </a:rPr>
-              <a:t> or Plotly to change the visualization.)</a:t>
-            </a:r>
-          </a:p>
-          <a:p>
-            <a:pPr lvl="1" fontAlgn="t">
-              <a:spcBef>
-                <a:spcPts val="0"/>
-              </a:spcBef>
-            </a:pPr>
-            <a:r>
-              <a:rPr lang="en-US" sz="1100" dirty="0">
-                <a:cs typeface="Lucida Sans Unicode" panose="020B0602030504020204" pitchFamily="34" charset="0"/>
-              </a:rPr>
-              <a:t>Create an idea with mock data that simulates how machine learning might be used.</a:t>
-            </a:r>
-          </a:p>
-          <a:p>
-            <a:pPr lvl="1" fontAlgn="t">
-              <a:spcBef>
-                <a:spcPts val="0"/>
-              </a:spcBef>
-            </a:pPr>
-            <a:r>
-              <a:rPr lang="en-US" sz="1100" dirty="0">
-                <a:cs typeface="Lucida Sans Unicode" panose="020B0602030504020204" pitchFamily="34" charset="0"/>
-              </a:rPr>
-              <a:t>Create an analysis of existing data to make a prediction, classification, or regression.</a:t>
+              <a:rPr lang="en-US" sz="2500" dirty="0" err="1">
+                <a:solidFill>
+                  <a:srgbClr val="00B050"/>
+                </a:solidFill>
+              </a:rPr>
+              <a:t>Scikit</a:t>
+            </a:r>
+            <a:r>
+              <a:rPr lang="en-US" sz="2500" dirty="0">
+                <a:solidFill>
+                  <a:srgbClr val="00B050"/>
+                </a:solidFill>
+              </a:rPr>
+              <a:t>-Learn</a:t>
             </a:r>
           </a:p>
         </p:txBody>
@@ -6287,7 +6083,7 @@
                 <a:latin typeface="Lucida Sans Unicode" panose="020B0602030504020204" pitchFamily="34" charset="0"/>
                 <a:cs typeface="Lucida Sans Unicode" panose="020B0602030504020204" pitchFamily="34" charset="0"/>
               </a:rPr>
-              <a:t>Attributes &amp; Definition</a:t>
+              <a:t>Visualizations</a:t>
             </a:r>
           </a:p>
         </p:txBody>
@@ -6326,20 +6122,49 @@
               </a:spcBef>
             </a:pPr>
             <a:r>
-              <a:rPr lang="en-US" sz="1800" b="1" dirty="0">
-                <a:cs typeface="Lucida Sans Unicode" panose="020B0602030504020204" pitchFamily="34" charset="0"/>
-              </a:rPr>
-              <a:t>Acousticness</a:t>
-            </a:r>
-            <a:r>
-              <a:rPr lang="en-US" sz="1600" dirty="0">
-                <a:cs typeface="Lucida Sans Unicode" panose="020B0602030504020204" pitchFamily="34" charset="0"/>
-              </a:rPr>
-              <a:t> – High acousticness has more</a:t>
-            </a:r>
-            <a:r>
-              <a:rPr lang="en-US" sz="1600" dirty="0"/>
-              <a:t> natural acoustic sounds, while songs with a low acousticness will consists of mostly electric sounds. A confidence measure from 0.0 to 1.0, 1.0 represents high confidence the track is acoustic. </a:t>
+              <a:rPr lang="en-US" sz="1400" b="1" dirty="0">
+                <a:cs typeface="Lucida Sans Unicode" panose="020B0602030504020204" pitchFamily="34" charset="0"/>
+              </a:rPr>
+              <a:t>PRIORITIES</a:t>
+            </a:r>
+          </a:p>
+          <a:p>
+            <a:pPr lvl="1">
+              <a:spcBef>
+                <a:spcPts val="0"/>
+              </a:spcBef>
+            </a:pPr>
+            <a:r>
+              <a:rPr lang="en-US" sz="1400" dirty="0">
+                <a:cs typeface="Lucida Sans Unicode" panose="020B0602030504020204" pitchFamily="34" charset="0"/>
+              </a:rPr>
+              <a:t>Clean the attributes data and convert to percentile comparison to the rest of the dataset</a:t>
+            </a:r>
+          </a:p>
+          <a:p>
+            <a:pPr lvl="1">
+              <a:spcBef>
+                <a:spcPts val="0"/>
+              </a:spcBef>
+            </a:pPr>
+            <a:r>
+              <a:rPr lang="en-US" sz="1400" dirty="0">
+                <a:cs typeface="Lucida Sans Unicode" panose="020B0602030504020204" pitchFamily="34" charset="0"/>
+              </a:rPr>
+              <a:t>Search icon or dropdown option</a:t>
+            </a:r>
+          </a:p>
+          <a:p>
+            <a:pPr lvl="1">
+              <a:spcBef>
+                <a:spcPts val="0"/>
+              </a:spcBef>
+            </a:pPr>
+            <a:r>
+              <a:rPr lang="en-US" sz="1400" dirty="0">
+                <a:cs typeface="Lucida Sans Unicode" panose="020B0602030504020204" pitchFamily="34" charset="0"/>
+              </a:rPr>
+              <a:t>Spotify API</a:t>
             </a:r>
           </a:p>
           <a:p>
@@ -6348,33 +6173,7 @@
                 <a:spcPts val="0"/>
               </a:spcBef>
             </a:pPr>
-            <a:r>
-              <a:rPr lang="en-US" sz="1800" b="1" dirty="0">
-                <a:cs typeface="Lucida Sans Unicode" panose="020B0602030504020204" pitchFamily="34" charset="0"/>
-              </a:rPr>
-              <a:t>Danceability</a:t>
-            </a:r>
-            <a:r>
-              <a:rPr lang="en-US" sz="1600" dirty="0">
-                <a:cs typeface="Lucida Sans Unicode" panose="020B0602030504020204" pitchFamily="34" charset="0"/>
-              </a:rPr>
-              <a:t> - </a:t>
-            </a:r>
-            <a:r>
-              <a:rPr lang="en-US" sz="1600" dirty="0"/>
-              <a:t>A value of 0.0 is least danceable and 1.0 is most danceable. </a:t>
-            </a:r>
-            <a:r>
-              <a:rPr lang="en-US" sz="1600" dirty="0">
-                <a:cs typeface="Lucida Sans Unicode" panose="020B0602030504020204" pitchFamily="34" charset="0"/>
-              </a:rPr>
-              <a:t>B</a:t>
-            </a:r>
-            <a:r>
-              <a:rPr lang="en-US" sz="1600" dirty="0"/>
-              <a:t>ased on a combination of musical elements including tempo, rhythm stability, beat strength, and overall regularity. </a:t>
-            </a:r>
-            <a:endParaRPr lang="en-US" sz="1600" dirty="0">
+            <a:endParaRPr lang="en-US" sz="1400" b="1" dirty="0">
               <a:cs typeface="Lucida Sans Unicode" panose="020B0602030504020204" pitchFamily="34" charset="0"/>
             </a:endParaRPr>
           </a:p>
@@ -6385,16 +6184,227 @@
               </a:spcBef>
             </a:pPr>
             <a:r>
-              <a:rPr lang="en-US" sz="1800" b="1" dirty="0">
-                <a:cs typeface="Lucida Sans Unicode" panose="020B0602030504020204" pitchFamily="34" charset="0"/>
-              </a:rPr>
-              <a:t>Duration </a:t>
-            </a:r>
-            <a:r>
-              <a:rPr lang="en-US" sz="1600" dirty="0">
-                <a:cs typeface="Lucida Sans Unicode" panose="020B0602030504020204" pitchFamily="34" charset="0"/>
-              </a:rPr>
-              <a:t>– The length of the song.</a:t>
+              <a:rPr lang="en-US" sz="1400" b="1" dirty="0">
+                <a:cs typeface="Lucida Sans Unicode" panose="020B0602030504020204" pitchFamily="34" charset="0"/>
+              </a:rPr>
+              <a:t>DASHBOARD LAYOUT </a:t>
+            </a:r>
+            <a:r>
+              <a:rPr lang="en-US" sz="1400" dirty="0">
+                <a:cs typeface="Lucida Sans Unicode" panose="020B0602030504020204" pitchFamily="34" charset="0"/>
+              </a:rPr>
+              <a:t>using </a:t>
+            </a:r>
+            <a:r>
+              <a:rPr lang="en-US" sz="1400" dirty="0">
+                <a:solidFill>
+                  <a:srgbClr val="0000FF"/>
+                </a:solidFill>
+                <a:cs typeface="Lucida Sans Unicode" panose="020B0602030504020204" pitchFamily="34" charset="0"/>
+              </a:rPr>
+              <a:t>JS </a:t>
+            </a:r>
+            <a:r>
+              <a:rPr lang="en-US" sz="1400" dirty="0" err="1">
+                <a:solidFill>
+                  <a:srgbClr val="0000FF"/>
+                </a:solidFill>
+                <a:cs typeface="Lucida Sans Unicode" panose="020B0602030504020204" pitchFamily="34" charset="0"/>
+              </a:rPr>
+              <a:t>D3</a:t>
+            </a:r>
+            <a:r>
+              <a:rPr lang="en-US" sz="1400" dirty="0">
+                <a:cs typeface="Lucida Sans Unicode" panose="020B0602030504020204" pitchFamily="34" charset="0"/>
+              </a:rPr>
+              <a:t>:</a:t>
+            </a:r>
+          </a:p>
+          <a:p>
+            <a:pPr lvl="1">
+              <a:spcBef>
+                <a:spcPts val="0"/>
+              </a:spcBef>
+            </a:pPr>
+            <a:r>
+              <a:rPr lang="en-US" sz="1400" dirty="0">
+                <a:cs typeface="Lucida Sans Unicode" panose="020B0602030504020204" pitchFamily="34" charset="0"/>
+              </a:rPr>
+              <a:t>"Performance" – </a:t>
+            </a:r>
+            <a:r>
+              <a:rPr lang="en-US" sz="1400" b="1" dirty="0">
+                <a:cs typeface="Lucida Sans Unicode" panose="020B0602030504020204" pitchFamily="34" charset="0"/>
+              </a:rPr>
+              <a:t>Line graph </a:t>
+            </a:r>
+            <a:r>
+              <a:rPr lang="en-US" sz="1400" dirty="0">
+                <a:cs typeface="Lucida Sans Unicode" panose="020B0602030504020204" pitchFamily="34" charset="0"/>
+              </a:rPr>
+              <a:t>of the average attributes by the selected Artist</a:t>
+            </a:r>
+            <a:endParaRPr lang="en-US" sz="1400" dirty="0">
+              <a:solidFill>
+                <a:srgbClr val="FF0000"/>
+              </a:solidFill>
+              <a:cs typeface="Lucida Sans Unicode" panose="020B0602030504020204" pitchFamily="34" charset="0"/>
+            </a:endParaRPr>
+          </a:p>
+          <a:p>
+            <a:pPr lvl="2">
+              <a:spcBef>
+                <a:spcPts val="0"/>
+              </a:spcBef>
+            </a:pPr>
+            <a:r>
+              <a:rPr lang="en-US" sz="1400" dirty="0">
+                <a:cs typeface="Lucida Sans Unicode" panose="020B0602030504020204" pitchFamily="34" charset="0"/>
+              </a:rPr>
+              <a:t>Make a boolean of the song duration</a:t>
+            </a:r>
+          </a:p>
+          <a:p>
+            <a:pPr lvl="1">
+              <a:spcBef>
+                <a:spcPts val="0"/>
+              </a:spcBef>
+            </a:pPr>
+            <a:r>
+              <a:rPr lang="en-US" sz="1400" dirty="0">
+                <a:cs typeface="Lucida Sans Unicode" panose="020B0602030504020204" pitchFamily="34" charset="0"/>
+              </a:rPr>
+              <a:t>"Total shipments": </a:t>
+            </a:r>
+            <a:r>
+              <a:rPr lang="en-US" sz="1400" b="1" dirty="0">
+                <a:cs typeface="Lucida Sans Unicode" panose="020B0602030504020204" pitchFamily="34" charset="0"/>
+              </a:rPr>
+              <a:t>Info Grid</a:t>
+            </a:r>
+            <a:r>
+              <a:rPr lang="en-US" sz="1400" dirty="0">
+                <a:cs typeface="Lucida Sans Unicode" panose="020B0602030504020204" pitchFamily="34" charset="0"/>
+              </a:rPr>
+              <a:t> of the selected Artist that contains: Name, First album name &amp; year, Followers</a:t>
+            </a:r>
+          </a:p>
+          <a:p>
+            <a:pPr lvl="1">
+              <a:spcBef>
+                <a:spcPts val="0"/>
+              </a:spcBef>
+            </a:pPr>
+            <a:r>
+              <a:rPr lang="en-US" sz="1400" dirty="0">
+                <a:cs typeface="Lucida Sans Unicode" panose="020B0602030504020204" pitchFamily="34" charset="0"/>
+              </a:rPr>
+              <a:t>“Daily sales": Last 6-year </a:t>
+            </a:r>
+            <a:r>
+              <a:rPr lang="en-US" sz="1400" b="1" dirty="0">
+                <a:cs typeface="Lucida Sans Unicode" panose="020B0602030504020204" pitchFamily="34" charset="0"/>
+              </a:rPr>
+              <a:t>Bar graph </a:t>
+            </a:r>
+            <a:r>
+              <a:rPr lang="en-US" sz="1400" dirty="0">
+                <a:cs typeface="Lucida Sans Unicode" panose="020B0602030504020204" pitchFamily="34" charset="0"/>
+              </a:rPr>
+              <a:t>of how frequently the selected artist featured in Top 100</a:t>
+            </a:r>
+          </a:p>
+          <a:p>
+            <a:pPr lvl="1">
+              <a:spcBef>
+                <a:spcPts val="0"/>
+              </a:spcBef>
+            </a:pPr>
+            <a:r>
+              <a:rPr lang="en-US" sz="1400" dirty="0">
+                <a:cs typeface="Lucida Sans Unicode" panose="020B0602030504020204" pitchFamily="34" charset="0"/>
+              </a:rPr>
+              <a:t>"Completed tasks": </a:t>
+            </a:r>
+            <a:r>
+              <a:rPr lang="en-US" sz="1400" b="1" dirty="0">
+                <a:solidFill>
+                  <a:srgbClr val="FF0000"/>
+                </a:solidFill>
+                <a:cs typeface="Lucida Sans Unicode" panose="020B0602030504020204" pitchFamily="34" charset="0"/>
+              </a:rPr>
+              <a:t>BONUS</a:t>
+            </a:r>
+            <a:r>
+              <a:rPr lang="en-US" sz="1400" dirty="0">
+                <a:cs typeface="Lucida Sans Unicode" panose="020B0602030504020204" pitchFamily="34" charset="0"/>
+              </a:rPr>
+              <a:t> </a:t>
+            </a:r>
+            <a:r>
+              <a:rPr lang="en-US" sz="1400" b="1" dirty="0">
+                <a:cs typeface="Lucida Sans Unicode" panose="020B0602030504020204" pitchFamily="34" charset="0"/>
+              </a:rPr>
+              <a:t>Spotify API </a:t>
+            </a:r>
+            <a:r>
+              <a:rPr lang="en-US" sz="1400" dirty="0">
+                <a:cs typeface="Lucida Sans Unicode" panose="020B0602030504020204" pitchFamily="34" charset="0"/>
+              </a:rPr>
+              <a:t>for the current top song of the artist</a:t>
+            </a:r>
+          </a:p>
+          <a:p>
+            <a:pPr lvl="1">
+              <a:spcBef>
+                <a:spcPts val="0"/>
+              </a:spcBef>
+            </a:pPr>
+            <a:r>
+              <a:rPr lang="en-US" sz="1400" dirty="0">
+                <a:cs typeface="Lucida Sans Unicode" panose="020B0602030504020204" pitchFamily="34" charset="0"/>
+              </a:rPr>
+              <a:t>“Tasks”: </a:t>
+            </a:r>
+            <a:r>
+              <a:rPr lang="en-US" sz="1400" b="1" dirty="0">
+                <a:cs typeface="Lucida Sans Unicode" panose="020B0602030504020204" pitchFamily="34" charset="0"/>
+              </a:rPr>
+              <a:t>Word cloud</a:t>
+            </a:r>
+            <a:r>
+              <a:rPr lang="en-US" sz="1400" dirty="0">
+                <a:cs typeface="Lucida Sans Unicode" panose="020B0602030504020204" pitchFamily="34" charset="0"/>
+              </a:rPr>
+              <a:t> of the selected Artist’s songs</a:t>
+            </a:r>
+            <a:endParaRPr lang="en-US" sz="1400" b="1" dirty="0">
+              <a:cs typeface="Lucida Sans Unicode" panose="020B0602030504020204" pitchFamily="34" charset="0"/>
+            </a:endParaRPr>
+          </a:p>
+          <a:p>
+            <a:pPr lvl="1">
+              <a:spcBef>
+                <a:spcPts val="0"/>
+              </a:spcBef>
+            </a:pPr>
+            <a:r>
+              <a:rPr lang="en-US" sz="1400" dirty="0">
+                <a:cs typeface="Lucida Sans Unicode" panose="020B0602030504020204" pitchFamily="34" charset="0"/>
+              </a:rPr>
+              <a:t>“Simple table”: </a:t>
+            </a:r>
+            <a:r>
+              <a:rPr lang="en-US" sz="1400" b="1" dirty="0">
+                <a:cs typeface="Lucida Sans Unicode" panose="020B0602030504020204" pitchFamily="34" charset="0"/>
+              </a:rPr>
+              <a:t>Table</a:t>
+            </a:r>
+            <a:r>
+              <a:rPr lang="en-US" sz="1400" dirty="0">
+                <a:cs typeface="Lucida Sans Unicode" panose="020B0602030504020204" pitchFamily="34" charset="0"/>
+              </a:rPr>
+              <a:t> of the selected Artist’s songs and albums</a:t>
             </a:r>
           </a:p>
           <a:p>
@@ -6404,24 +6414,23 @@
               </a:spcBef>
             </a:pPr>
             <a:r>
-              <a:rPr lang="en-US" sz="1800" b="1" dirty="0">
-                <a:cs typeface="Lucida Sans Unicode" panose="020B0602030504020204" pitchFamily="34" charset="0"/>
-              </a:rPr>
-              <a:t>Energy</a:t>
-            </a:r>
-            <a:r>
-              <a:rPr lang="en-US" sz="1600" dirty="0">
-                <a:cs typeface="Lucida Sans Unicode" panose="020B0602030504020204" pitchFamily="34" charset="0"/>
-              </a:rPr>
-              <a:t> - </a:t>
-            </a:r>
-            <a:r>
-              <a:rPr lang="en-US" sz="1600" dirty="0"/>
-              <a:t>Energy is a measure from 0.0 to 1.0 and represents a perceptual measure of intensity and activity. Energetic tracks feel fast, loud, and noisy. </a:t>
-            </a:r>
-            <a:endParaRPr lang="en-US" sz="1600" dirty="0">
-              <a:cs typeface="Lucida Sans Unicode" panose="020B0602030504020204" pitchFamily="34" charset="0"/>
-            </a:endParaRPr>
+              <a:rPr lang="en-US" sz="1400" dirty="0">
+                <a:cs typeface="Lucida Sans Unicode" panose="020B0602030504020204" pitchFamily="34" charset="0"/>
+              </a:rPr>
+              <a:t>“</a:t>
+            </a:r>
+            <a:r>
+              <a:rPr lang="en-US" sz="1400" b="1" dirty="0">
+                <a:cs typeface="Lucida Sans Unicode" panose="020B0602030504020204" pitchFamily="34" charset="0"/>
+              </a:rPr>
+              <a:t>ICONS</a:t>
+            </a:r>
+            <a:r>
+              <a:rPr lang="en-US" sz="1400" dirty="0">
+                <a:cs typeface="Lucida Sans Unicode" panose="020B0602030504020204" pitchFamily="34" charset="0"/>
+              </a:rPr>
+              <a:t>”: Same as previous project profiles</a:t>
+            </a:r>
           </a:p>
           <a:p>
             <a:pPr>
@@ -6430,20 +6439,37 @@
               </a:spcBef>
             </a:pPr>
             <a:r>
-              <a:rPr lang="en-US" sz="1800" b="1" dirty="0">
-                <a:cs typeface="Lucida Sans Unicode" panose="020B0602030504020204" pitchFamily="34" charset="0"/>
-              </a:rPr>
-              <a:t>Instrumentalness</a:t>
-            </a:r>
-            <a:r>
-              <a:rPr lang="en-US" sz="1600" dirty="0">
-                <a:cs typeface="Lucida Sans Unicode" panose="020B0602030504020204" pitchFamily="34" charset="0"/>
-              </a:rPr>
-              <a:t> – </a:t>
-            </a:r>
-            <a:r>
-              <a:rPr lang="en-US" sz="1600" dirty="0"/>
-              <a:t>The closer the instrumentalness value is to 1.0, the greater likelihood the track contains no vocal content. </a:t>
+              <a:rPr lang="en-US" sz="1400" dirty="0">
+                <a:cs typeface="Lucida Sans Unicode" panose="020B0602030504020204" pitchFamily="34" charset="0"/>
+              </a:rPr>
+              <a:t>“</a:t>
+            </a:r>
+            <a:r>
+              <a:rPr lang="en-US" sz="1400" b="1" dirty="0">
+                <a:cs typeface="Lucida Sans Unicode" panose="020B0602030504020204" pitchFamily="34" charset="0"/>
+              </a:rPr>
+              <a:t>MAPS</a:t>
+            </a:r>
+            <a:r>
+              <a:rPr lang="en-US" sz="1400" dirty="0">
+                <a:cs typeface="Lucida Sans Unicode" panose="020B0602030504020204" pitchFamily="34" charset="0"/>
+              </a:rPr>
+              <a:t>”: </a:t>
+            </a:r>
+            <a:r>
+              <a:rPr lang="en-US" sz="1400" dirty="0">
+                <a:solidFill>
+                  <a:srgbClr val="0000FF"/>
+                </a:solidFill>
+                <a:cs typeface="Lucida Sans Unicode" panose="020B0602030504020204" pitchFamily="34" charset="0"/>
+              </a:rPr>
+              <a:t>Tableau</a:t>
+            </a:r>
+            <a:r>
+              <a:rPr lang="en-US" sz="1400" dirty="0">
+                <a:cs typeface="Lucida Sans Unicode" panose="020B0602030504020204" pitchFamily="34" charset="0"/>
+              </a:rPr>
+              <a:t> timeline animation</a:t>
             </a:r>
           </a:p>
           <a:p>
@@ -6453,24 +6479,23 @@
               </a:spcBef>
             </a:pPr>
             <a:r>
-              <a:rPr lang="en-US" sz="1800" b="1" dirty="0">
-                <a:cs typeface="Lucida Sans Unicode" panose="020B0602030504020204" pitchFamily="34" charset="0"/>
-              </a:rPr>
-              <a:t>Liveness</a:t>
-            </a:r>
-            <a:r>
-              <a:rPr lang="en-US" sz="1600" dirty="0">
-                <a:cs typeface="Lucida Sans Unicode" panose="020B0602030504020204" pitchFamily="34" charset="0"/>
-              </a:rPr>
-              <a:t> - </a:t>
-            </a:r>
-            <a:r>
-              <a:rPr lang="en-US" sz="1600" dirty="0"/>
-              <a:t>Detects if the recording is live with an audience. A value closer to 1 has a strong likelihood that the track is live. </a:t>
-            </a:r>
-            <a:endParaRPr lang="en-US" sz="1600" dirty="0">
-              <a:cs typeface="Lucida Sans Unicode" panose="020B0602030504020204" pitchFamily="34" charset="0"/>
-            </a:endParaRPr>
+              <a:rPr lang="en-US" sz="1400" dirty="0">
+                <a:cs typeface="Lucida Sans Unicode" panose="020B0602030504020204" pitchFamily="34" charset="0"/>
+              </a:rPr>
+              <a:t>“</a:t>
+            </a:r>
+            <a:r>
+              <a:rPr lang="en-US" sz="1400" b="1" dirty="0">
+                <a:cs typeface="Lucida Sans Unicode" panose="020B0602030504020204" pitchFamily="34" charset="0"/>
+              </a:rPr>
+              <a:t>NOTIFICATIONS</a:t>
+            </a:r>
+            <a:r>
+              <a:rPr lang="en-US" sz="1400" dirty="0">
+                <a:cs typeface="Lucida Sans Unicode" panose="020B0602030504020204" pitchFamily="34" charset="0"/>
+              </a:rPr>
+              <a:t>”: TBD</a:t>
+            </a:r>
           </a:p>
           <a:p>
             <a:pPr>
@@ -6479,24 +6504,23 @@
               </a:spcBef>
             </a:pPr>
             <a:r>
-              <a:rPr lang="en-US" sz="1800" b="1" dirty="0">
-                <a:cs typeface="Lucida Sans Unicode" panose="020B0602030504020204" pitchFamily="34" charset="0"/>
-              </a:rPr>
-              <a:t>Loudness</a:t>
-            </a:r>
-            <a:r>
-              <a:rPr lang="en-US" sz="1600" dirty="0">
-                <a:cs typeface="Lucida Sans Unicode" panose="020B0602030504020204" pitchFamily="34" charset="0"/>
-              </a:rPr>
-              <a:t> - </a:t>
-            </a:r>
-            <a:r>
-              <a:rPr lang="en-US" sz="1600" dirty="0"/>
-              <a:t>The higher the value, the louder the song. </a:t>
-            </a:r>
-            <a:endParaRPr lang="en-US" sz="1600" dirty="0">
-              <a:cs typeface="Lucida Sans Unicode" panose="020B0602030504020204" pitchFamily="34" charset="0"/>
-            </a:endParaRPr>
+              <a:rPr lang="en-US" sz="1400" dirty="0">
+                <a:cs typeface="Lucida Sans Unicode" panose="020B0602030504020204" pitchFamily="34" charset="0"/>
+              </a:rPr>
+              <a:t>“</a:t>
+            </a:r>
+            <a:r>
+              <a:rPr lang="en-US" sz="1400" b="1" dirty="0">
+                <a:cs typeface="Lucida Sans Unicode" panose="020B0602030504020204" pitchFamily="34" charset="0"/>
+              </a:rPr>
+              <a:t>USER PROFILE</a:t>
+            </a:r>
+            <a:r>
+              <a:rPr lang="en-US" sz="1400" dirty="0">
+                <a:cs typeface="Lucida Sans Unicode" panose="020B0602030504020204" pitchFamily="34" charset="0"/>
+              </a:rPr>
+              <a:t>”: Machine Learning with test results</a:t>
+            </a:r>
           </a:p>
           <a:p>
             <a:pPr>
@@ -6505,24 +6529,23 @@
               </a:spcBef>
             </a:pPr>
             <a:r>
-              <a:rPr lang="en-US" sz="1800" b="1" dirty="0">
-                <a:cs typeface="Lucida Sans Unicode" panose="020B0602030504020204" pitchFamily="34" charset="0"/>
-              </a:rPr>
-              <a:t>Mode - </a:t>
-            </a:r>
-            <a:r>
-              <a:rPr lang="en-US" sz="1600" dirty="0">
-                <a:cs typeface="Lucida Sans Unicode" panose="020B0602030504020204" pitchFamily="34" charset="0"/>
-              </a:rPr>
-              <a:t>T</a:t>
-            </a:r>
-            <a:r>
-              <a:rPr lang="en-US" sz="1600" dirty="0"/>
-              <a:t>he modality of a track, the type of scale from which its melodic content is derived. Major is 1 and minor is 0.</a:t>
-            </a:r>
-            <a:endParaRPr lang="en-US" sz="1600" b="1" dirty="0">
-              <a:cs typeface="Lucida Sans Unicode" panose="020B0602030504020204" pitchFamily="34" charset="0"/>
-            </a:endParaRPr>
+              <a:rPr lang="en-US" sz="1400" dirty="0">
+                <a:cs typeface="Lucida Sans Unicode" panose="020B0602030504020204" pitchFamily="34" charset="0"/>
+              </a:rPr>
+              <a:t>“</a:t>
+            </a:r>
+            <a:r>
+              <a:rPr lang="en-US" sz="1400" b="1" dirty="0">
+                <a:cs typeface="Lucida Sans Unicode" panose="020B0602030504020204" pitchFamily="34" charset="0"/>
+              </a:rPr>
+              <a:t>TABLE LIST</a:t>
+            </a:r>
+            <a:r>
+              <a:rPr lang="en-US" sz="1400" dirty="0">
+                <a:cs typeface="Lucida Sans Unicode" panose="020B0602030504020204" pitchFamily="34" charset="0"/>
+              </a:rPr>
+              <a:t>”: Raw data table</a:t>
+            </a:r>
           </a:p>
           <a:p>
             <a:pPr>
@@ -6531,24 +6554,23 @@
               </a:spcBef>
             </a:pPr>
             <a:r>
-              <a:rPr lang="en-US" sz="1800" b="1" dirty="0">
-                <a:cs typeface="Lucida Sans Unicode" panose="020B0602030504020204" pitchFamily="34" charset="0"/>
-              </a:rPr>
-              <a:t>Popularity</a:t>
-            </a:r>
-            <a:r>
-              <a:rPr lang="en-US" sz="1600" dirty="0">
-                <a:cs typeface="Lucida Sans Unicode" panose="020B0602030504020204" pitchFamily="34" charset="0"/>
-              </a:rPr>
-              <a:t> - </a:t>
-            </a:r>
-            <a:r>
-              <a:rPr lang="en-US" sz="1600" dirty="0"/>
-              <a:t>The higher the value the more popular the song is. </a:t>
-            </a:r>
-            <a:endParaRPr lang="en-US" sz="1600" dirty="0">
-              <a:cs typeface="Lucida Sans Unicode" panose="020B0602030504020204" pitchFamily="34" charset="0"/>
-            </a:endParaRPr>
+              <a:rPr lang="en-US" sz="1400" dirty="0">
+                <a:cs typeface="Lucida Sans Unicode" panose="020B0602030504020204" pitchFamily="34" charset="0"/>
+              </a:rPr>
+              <a:t>“</a:t>
+            </a:r>
+            <a:r>
+              <a:rPr lang="en-US" sz="1400" b="1" dirty="0">
+                <a:cs typeface="Lucida Sans Unicode" panose="020B0602030504020204" pitchFamily="34" charset="0"/>
+              </a:rPr>
+              <a:t>TYPOGRAPHY</a:t>
+            </a:r>
+            <a:r>
+              <a:rPr lang="en-US" sz="1400" dirty="0">
+                <a:cs typeface="Lucida Sans Unicode" panose="020B0602030504020204" pitchFamily="34" charset="0"/>
+              </a:rPr>
+              <a:t>”: Write up of project summary and findings</a:t>
+            </a:r>
           </a:p>
           <a:p>
             <a:pPr>
@@ -6557,24 +6579,23 @@
               </a:spcBef>
             </a:pPr>
             <a:r>
-              <a:rPr lang="en-US" sz="1800" b="1" dirty="0">
-                <a:cs typeface="Lucida Sans Unicode" panose="020B0602030504020204" pitchFamily="34" charset="0"/>
-              </a:rPr>
-              <a:t>Speechiness </a:t>
-            </a:r>
-            <a:r>
-              <a:rPr lang="en-US" sz="1600" dirty="0">
-                <a:cs typeface="Lucida Sans Unicode" panose="020B0602030504020204" pitchFamily="34" charset="0"/>
-              </a:rPr>
-              <a:t>- </a:t>
-            </a:r>
-            <a:r>
-              <a:rPr lang="en-US" sz="1600" dirty="0"/>
-              <a:t>Speechiness detects the presence of spoken words in a track. Values between 0.33 and 0.66 describe tracks that may contain both music and speech, including such cases as rap music. The closer the value is to 1 the probability it is entirely spoken word.</a:t>
-            </a:r>
-            <a:endParaRPr lang="en-US" sz="1600" dirty="0">
-              <a:cs typeface="Lucida Sans Unicode" panose="020B0602030504020204" pitchFamily="34" charset="0"/>
-            </a:endParaRPr>
+              <a:rPr lang="en-US" sz="1400" dirty="0">
+                <a:cs typeface="Lucida Sans Unicode" panose="020B0602030504020204" pitchFamily="34" charset="0"/>
+              </a:rPr>
+              <a:t>“</a:t>
+            </a:r>
+            <a:r>
+              <a:rPr lang="en-US" sz="1400" b="1" dirty="0">
+                <a:cs typeface="Lucida Sans Unicode" panose="020B0602030504020204" pitchFamily="34" charset="0"/>
+              </a:rPr>
+              <a:t>RTL SUPPORT</a:t>
+            </a:r>
+            <a:r>
+              <a:rPr lang="en-US" sz="1400" dirty="0">
+                <a:cs typeface="Lucida Sans Unicode" panose="020B0602030504020204" pitchFamily="34" charset="0"/>
+              </a:rPr>
+              <a:t>”: Changes the alignment from R to L</a:t>
+            </a:r>
           </a:p>
           <a:p>
             <a:pPr>
@@ -6582,108 +6603,99 @@
                 <a:spcPts val="0"/>
               </a:spcBef>
             </a:pPr>
-            <a:r>
-              <a:rPr lang="en-US" sz="1800" b="1" dirty="0">
-                <a:cs typeface="Lucida Sans Unicode" panose="020B0602030504020204" pitchFamily="34" charset="0"/>
-              </a:rPr>
-              <a:t>Tempo</a:t>
-            </a:r>
-            <a:r>
-              <a:rPr lang="en-US" sz="1600" dirty="0">
-                <a:cs typeface="Lucida Sans Unicode" panose="020B0602030504020204" pitchFamily="34" charset="0"/>
-              </a:rPr>
-              <a:t> - </a:t>
-            </a:r>
-            <a:r>
-              <a:rPr lang="en-US" sz="1600" dirty="0"/>
-              <a:t>The overall estimated tempo of a track in beats per minute (BPM). </a:t>
-            </a:r>
-          </a:p>
-          <a:p>
-            <a:pPr>
+            <a:endParaRPr lang="en-US" sz="1400" dirty="0">
+              <a:cs typeface="Lucida Sans Unicode" panose="020B0602030504020204" pitchFamily="34" charset="0"/>
+            </a:endParaRPr>
+          </a:p>
+          <a:p>
+            <a:pPr fontAlgn="t">
               <a:spcBef>
                 <a:spcPts val="0"/>
               </a:spcBef>
             </a:pPr>
             <a:r>
-              <a:rPr lang="en-US" sz="1800" b="1" dirty="0">
-                <a:cs typeface="Lucida Sans Unicode" panose="020B0602030504020204" pitchFamily="34" charset="0"/>
-              </a:rPr>
-              <a:t>Time Signature – </a:t>
-            </a:r>
-            <a:r>
-              <a:rPr lang="en-US" sz="1600" dirty="0">
-                <a:cs typeface="Lucida Sans Unicode" panose="020B0602030504020204" pitchFamily="34" charset="0"/>
-              </a:rPr>
-              <a:t>S</a:t>
-            </a:r>
-            <a:r>
-              <a:rPr lang="en-US" sz="1600" dirty="0"/>
-              <a:t>pecifies how many beats are in each bar (or measure).</a:t>
-            </a:r>
-            <a:endParaRPr lang="en-US" sz="1600" b="1" dirty="0">
-              <a:cs typeface="Lucida Sans Unicode" panose="020B0602030504020204" pitchFamily="34" charset="0"/>
-            </a:endParaRPr>
-          </a:p>
-          <a:p>
-            <a:pPr>
+              <a:rPr lang="en-US" sz="1400" dirty="0">
+                <a:cs typeface="Lucida Sans Unicode" panose="020B0602030504020204" pitchFamily="34" charset="0"/>
+              </a:rPr>
+              <a:t>Machine Learning overview:</a:t>
+            </a:r>
+          </a:p>
+          <a:p>
+            <a:pPr lvl="1" fontAlgn="t">
               <a:spcBef>
                 <a:spcPts val="0"/>
               </a:spcBef>
             </a:pPr>
             <a:r>
-              <a:rPr lang="en-US" sz="1800" b="1" dirty="0">
-                <a:cs typeface="Lucida Sans Unicode" panose="020B0602030504020204" pitchFamily="34" charset="0"/>
-              </a:rPr>
-              <a:t>Valence </a:t>
-            </a:r>
-            <a:r>
-              <a:rPr lang="en-US" sz="1600" dirty="0">
-                <a:cs typeface="Lucida Sans Unicode" panose="020B0602030504020204" pitchFamily="34" charset="0"/>
-              </a:rPr>
-              <a:t>- </a:t>
-            </a:r>
-            <a:r>
-              <a:rPr lang="en-US" sz="1600" dirty="0"/>
-              <a:t>A measure from 0.0 to 1.0 describing the musical positiveness conveyed by a track. Tracks with a value closer to 1 sound more positive while tracks with a value closer to 0 sound more negative.</a:t>
-            </a:r>
-          </a:p>
-          <a:p>
-            <a:pPr>
+              <a:rPr lang="en-US" sz="1400" dirty="0">
+                <a:cs typeface="Lucida Sans Unicode" panose="020B0602030504020204" pitchFamily="34" charset="0"/>
+              </a:rPr>
+              <a:t>Create a front-end interface that maps to an API to “smarten” the algorithm.</a:t>
+            </a:r>
+          </a:p>
+          <a:p>
+            <a:pPr lvl="1" fontAlgn="t">
               <a:spcBef>
                 <a:spcPts val="0"/>
               </a:spcBef>
             </a:pPr>
-            <a:endParaRPr lang="en-US" sz="1600" dirty="0">
-              <a:cs typeface="Lucida Sans Unicode" panose="020B0602030504020204" pitchFamily="34" charset="0"/>
-            </a:endParaRPr>
-          </a:p>
-          <a:p>
-            <a:pPr>
+            <a:r>
+              <a:rPr lang="en-US" sz="1400" dirty="0">
+                <a:cs typeface="Lucida Sans Unicode" panose="020B0602030504020204" pitchFamily="34" charset="0"/>
+              </a:rPr>
+              <a:t>Perform a deep dive of existing data using machine learning.</a:t>
+            </a:r>
+          </a:p>
+          <a:p>
+            <a:pPr lvl="1" fontAlgn="t">
               <a:spcBef>
                 <a:spcPts val="0"/>
               </a:spcBef>
             </a:pPr>
             <a:r>
-              <a:rPr lang="en-US" sz="1600" dirty="0">
-                <a:cs typeface="Lucida Sans Unicode" panose="020B0602030504020204" pitchFamily="34" charset="0"/>
-                <a:hlinkClick r:id="rId3"/>
-              </a:rPr>
-              <a:t>https://developer.spotify.com/documentation/web-api/reference/tracks/get-several-audio-features/</a:t>
-            </a:r>
-            <a:endParaRPr lang="en-US" sz="1600" dirty="0">
-              <a:cs typeface="Lucida Sans Unicode" panose="020B0602030504020204" pitchFamily="34" charset="0"/>
-            </a:endParaRPr>
-          </a:p>
-          <a:p>
-            <a:pPr>
+              <a:rPr lang="en-US" sz="1400" dirty="0">
+                <a:cs typeface="Lucida Sans Unicode" panose="020B0602030504020204" pitchFamily="34" charset="0"/>
+              </a:rPr>
+              <a:t>Create a visualization that continues to learn where clusters lie based on ML. (Use </a:t>
+            </a:r>
+            <a:r>
+              <a:rPr lang="en-US" sz="1400" dirty="0" err="1">
+                <a:cs typeface="Lucida Sans Unicode" panose="020B0602030504020204" pitchFamily="34" charset="0"/>
+              </a:rPr>
+              <a:t>D3</a:t>
+            </a:r>
+            <a:r>
+              <a:rPr lang="en-US" sz="1400" dirty="0">
+                <a:cs typeface="Lucida Sans Unicode" panose="020B0602030504020204" pitchFamily="34" charset="0"/>
+              </a:rPr>
+              <a:t> or Plotly to change the visualization.)</a:t>
+            </a:r>
+          </a:p>
+          <a:p>
+            <a:pPr lvl="1" fontAlgn="t">
               <a:spcBef>
                 <a:spcPts val="0"/>
               </a:spcBef>
             </a:pPr>
-            <a:endParaRPr lang="en-US" sz="1600" dirty="0">
-              <a:cs typeface="Lucida Sans Unicode" panose="020B0602030504020204" pitchFamily="34" charset="0"/>
-            </a:endParaRPr>
+            <a:r>
+              <a:rPr lang="en-US" sz="1400" dirty="0">
+                <a:cs typeface="Lucida Sans Unicode" panose="020B0602030504020204" pitchFamily="34" charset="0"/>
+              </a:rPr>
+              <a:t>Create an idea with mock data that simulates how machine learning might be used.</a:t>
+            </a:r>
+          </a:p>
+          <a:p>
+            <a:pPr lvl="1" fontAlgn="t">
+              <a:spcBef>
+                <a:spcPts val="0"/>
+              </a:spcBef>
+            </a:pPr>
+            <a:r>
+              <a:rPr lang="en-US" sz="1400" dirty="0">
+                <a:cs typeface="Lucida Sans Unicode" panose="020B0602030504020204" pitchFamily="34" charset="0"/>
+              </a:rPr>
+              <a:t>Create an analysis of existing data to make a prediction, classification, or regression.</a:t>
+            </a:r>
           </a:p>
         </p:txBody>
       </p:sp>
@@ -6970,6 +6982,932 @@
     </p:spTree>
     <p:extLst>
       <p:ext uri="{BB962C8B-B14F-4D97-AF65-F5344CB8AC3E}">
+        <p14:creationId xmlns:p14="http://schemas.microsoft.com/office/powerpoint/2010/main" val="919664302"/>
+      </p:ext>
+    </p:extLst>
+  </p:cSld>
+  <p:clrMapOvr>
+    <a:masterClrMapping/>
+  </p:clrMapOvr>
+</p:sld>
+</file>
+
+<file path=ppt/slides/slide5.xml><?xml version="1.0" encoding="utf-8"?>
+<p:sld xmlns:a="http://schemas.openxmlformats.org/drawingml/2006/main" xmlns:r="http://schemas.openxmlformats.org/officeDocument/2006/relationships" xmlns:p="http://schemas.openxmlformats.org/presentationml/2006/main">
+  <p:cSld>
+    <p:bg>
+      <p:bgPr>
+        <a:solidFill>
+          <a:schemeClr val="bg1"/>
+        </a:solidFill>
+        <a:effectLst/>
+      </p:bgPr>
+    </p:bg>
+    <p:spTree>
+      <p:nvGrpSpPr>
+        <p:cNvPr id="1" name=""/>
+        <p:cNvGrpSpPr/>
+        <p:nvPr/>
+      </p:nvGrpSpPr>
+      <p:grpSpPr>
+        <a:xfrm>
+          <a:off x="0" y="0"/>
+          <a:ext cx="0" cy="0"/>
+          <a:chOff x="0" y="0"/>
+          <a:chExt cx="0" cy="0"/>
+        </a:xfrm>
+      </p:grpSpPr>
+      <p:sp>
+        <p:nvSpPr>
+          <p:cNvPr id="8" name="Rectangle 7">
+            <a:extLst>
+              <a:ext uri="{FF2B5EF4-FFF2-40B4-BE49-F238E27FC236}">
+                <a16:creationId xmlns:a16="http://schemas.microsoft.com/office/drawing/2014/main" id="{2B566528-1B12-4246-9431-5C2D7D081168}"/>
+              </a:ext>
+              <a:ext uri="{C183D7F6-B498-43B3-948B-1728B52AA6E4}">
+                <adec:decorative xmlns:adec="http://schemas.microsoft.com/office/drawing/2017/decorative" val="1"/>
+              </a:ext>
+            </a:extLst>
+          </p:cNvPr>
+          <p:cNvSpPr>
+            <a:spLocks noGrp="1" noRot="1" noChangeAspect="1" noMove="1" noResize="1" noEditPoints="1" noAdjustHandles="1" noChangeArrowheads="1" noChangeShapeType="1" noTextEdit="1"/>
+          </p:cNvSpPr>
+          <p:nvPr>
+            <p:extLst>
+              <p:ext uri="{386F3935-93C4-4BCD-93E2-E3B085C9AB24}">
+                <p16:designElem xmlns:p16="http://schemas.microsoft.com/office/powerpoint/2015/main" val="1"/>
+              </p:ext>
+            </p:extLst>
+          </p:nvPr>
+        </p:nvSpPr>
+        <p:spPr>
+          <a:xfrm>
+            <a:off x="0" y="0"/>
+            <a:ext cx="12192000" cy="6858000"/>
+          </a:xfrm>
+          <a:prstGeom prst="rect">
+            <a:avLst/>
+          </a:prstGeom>
+          <a:solidFill>
+            <a:schemeClr val="bg1"/>
+          </a:solidFill>
+          <a:ln>
+            <a:noFill/>
+          </a:ln>
+        </p:spPr>
+        <p:style>
+          <a:lnRef idx="2">
+            <a:schemeClr val="accent1">
+              <a:shade val="50000"/>
+            </a:schemeClr>
+          </a:lnRef>
+          <a:fillRef idx="1">
+            <a:schemeClr val="accent1"/>
+          </a:fillRef>
+          <a:effectRef idx="0">
+            <a:schemeClr val="accent1"/>
+          </a:effectRef>
+          <a:fontRef idx="minor">
+            <a:schemeClr val="lt1"/>
+          </a:fontRef>
+        </p:style>
+        <p:txBody>
+          <a:bodyPr rtlCol="0" anchor="ctr"/>
+          <a:lstStyle/>
+          <a:p>
+            <a:pPr algn="ctr"/>
+            <a:endParaRPr lang="en-US" dirty="0">
+              <a:latin typeface="Lucida Sans Unicode" panose="020B0602030504020204" pitchFamily="34" charset="0"/>
+              <a:cs typeface="Lucida Sans Unicode" panose="020B0602030504020204" pitchFamily="34" charset="0"/>
+            </a:endParaRPr>
+          </a:p>
+        </p:txBody>
+      </p:sp>
+      <p:sp>
+        <p:nvSpPr>
+          <p:cNvPr id="2" name="Title 1">
+            <a:extLst>
+              <a:ext uri="{FF2B5EF4-FFF2-40B4-BE49-F238E27FC236}">
+                <a16:creationId xmlns:a16="http://schemas.microsoft.com/office/drawing/2014/main" id="{2B55EDA5-4130-4608-963E-3A8F45DBD4FD}"/>
+              </a:ext>
+            </a:extLst>
+          </p:cNvPr>
+          <p:cNvSpPr>
+            <a:spLocks noGrp="1"/>
+          </p:cNvSpPr>
+          <p:nvPr>
+            <p:ph type="title"/>
+          </p:nvPr>
+        </p:nvSpPr>
+        <p:spPr>
+          <a:xfrm>
+            <a:off x="643467" y="321734"/>
+            <a:ext cx="10905066" cy="1135737"/>
+          </a:xfrm>
+        </p:spPr>
+        <p:txBody>
+          <a:bodyPr>
+            <a:normAutofit/>
+          </a:bodyPr>
+          <a:lstStyle/>
+          <a:p>
+            <a:r>
+              <a:rPr lang="en-US" sz="3600" b="1" dirty="0">
+                <a:latin typeface="Lucida Sans Unicode" panose="020B0602030504020204" pitchFamily="34" charset="0"/>
+                <a:cs typeface="Lucida Sans Unicode" panose="020B0602030504020204" pitchFamily="34" charset="0"/>
+              </a:rPr>
+              <a:t>Attributes &amp; Definition</a:t>
+            </a:r>
+          </a:p>
+        </p:txBody>
+      </p:sp>
+      <p:sp>
+        <p:nvSpPr>
+          <p:cNvPr id="3" name="Content Placeholder 2">
+            <a:extLst>
+              <a:ext uri="{FF2B5EF4-FFF2-40B4-BE49-F238E27FC236}">
+                <a16:creationId xmlns:a16="http://schemas.microsoft.com/office/drawing/2014/main" id="{B6A62B10-DC73-437A-A2BA-250295B8111F}"/>
+              </a:ext>
+            </a:extLst>
+          </p:cNvPr>
+          <p:cNvSpPr>
+            <a:spLocks noGrp="1"/>
+          </p:cNvSpPr>
+          <p:nvPr>
+            <p:ph idx="1"/>
+          </p:nvPr>
+        </p:nvSpPr>
+        <p:spPr>
+          <a:xfrm>
+            <a:off x="643467" y="1166070"/>
+            <a:ext cx="10905066" cy="5148783"/>
+          </a:xfrm>
+        </p:spPr>
+        <p:txBody>
+          <a:bodyPr>
+            <a:noAutofit/>
+          </a:bodyPr>
+          <a:lstStyle/>
+          <a:p>
+            <a:pPr>
+              <a:spcBef>
+                <a:spcPts val="0"/>
+              </a:spcBef>
+            </a:pPr>
+            <a:r>
+              <a:rPr lang="en-US" sz="1800" b="1" dirty="0">
+                <a:solidFill>
+                  <a:srgbClr val="0000FF"/>
+                </a:solidFill>
+                <a:cs typeface="Lucida Sans Unicode" panose="020B0602030504020204" pitchFamily="34" charset="0"/>
+              </a:rPr>
+              <a:t>Acousticness</a:t>
+            </a:r>
+            <a:r>
+              <a:rPr lang="en-US" sz="1600" dirty="0">
+                <a:cs typeface="Lucida Sans Unicode" panose="020B0602030504020204" pitchFamily="34" charset="0"/>
+              </a:rPr>
+              <a:t> – High acousticness has more</a:t>
+            </a:r>
+            <a:r>
+              <a:rPr lang="en-US" sz="1600" dirty="0"/>
+              <a:t> natural acoustic sounds, while songs with a low acousticness will consists of mostly electric sounds. A confidence measure from 0.0 to 1.0, 1.0 represents high confidence the track is acoustic. </a:t>
+            </a:r>
+          </a:p>
+          <a:p>
+            <a:pPr>
+              <a:spcBef>
+                <a:spcPts val="0"/>
+              </a:spcBef>
+            </a:pPr>
+            <a:r>
+              <a:rPr lang="en-US" sz="1800" b="1" dirty="0">
+                <a:solidFill>
+                  <a:srgbClr val="0000FF"/>
+                </a:solidFill>
+                <a:cs typeface="Lucida Sans Unicode" panose="020B0602030504020204" pitchFamily="34" charset="0"/>
+              </a:rPr>
+              <a:t>Danceability</a:t>
+            </a:r>
+            <a:r>
+              <a:rPr lang="en-US" sz="1600" dirty="0">
+                <a:cs typeface="Lucida Sans Unicode" panose="020B0602030504020204" pitchFamily="34" charset="0"/>
+              </a:rPr>
+              <a:t> - </a:t>
+            </a:r>
+            <a:r>
+              <a:rPr lang="en-US" sz="1600" dirty="0"/>
+              <a:t>A value of 0.0 is least danceable and 1.0 is most danceable. </a:t>
+            </a:r>
+            <a:r>
+              <a:rPr lang="en-US" sz="1600" dirty="0">
+                <a:cs typeface="Lucida Sans Unicode" panose="020B0602030504020204" pitchFamily="34" charset="0"/>
+              </a:rPr>
+              <a:t>B</a:t>
+            </a:r>
+            <a:r>
+              <a:rPr lang="en-US" sz="1600" dirty="0"/>
+              <a:t>ased on a combination of musical elements including tempo, rhythm stability, beat strength, and overall regularity. </a:t>
+            </a:r>
+            <a:endParaRPr lang="en-US" sz="1600" dirty="0">
+              <a:cs typeface="Lucida Sans Unicode" panose="020B0602030504020204" pitchFamily="34" charset="0"/>
+            </a:endParaRPr>
+          </a:p>
+          <a:p>
+            <a:pPr>
+              <a:spcBef>
+                <a:spcPts val="0"/>
+              </a:spcBef>
+            </a:pPr>
+            <a:r>
+              <a:rPr lang="en-US" sz="1800" b="1" dirty="0">
+                <a:cs typeface="Lucida Sans Unicode" panose="020B0602030504020204" pitchFamily="34" charset="0"/>
+              </a:rPr>
+              <a:t>Duration </a:t>
+            </a:r>
+            <a:r>
+              <a:rPr lang="en-US" sz="1600" dirty="0">
+                <a:cs typeface="Lucida Sans Unicode" panose="020B0602030504020204" pitchFamily="34" charset="0"/>
+              </a:rPr>
+              <a:t>– The length of the song</a:t>
+            </a:r>
+            <a:r>
+              <a:rPr lang="en-US" sz="1600" dirty="0"/>
+              <a:t>. Divide by 60000 and add custom measure from </a:t>
+            </a:r>
+            <a:r>
+              <a:rPr lang="en-US" sz="1600" dirty="0">
+                <a:solidFill>
+                  <a:srgbClr val="FF0000"/>
+                </a:solidFill>
+              </a:rPr>
+              <a:t>0 – 4 is 0, above 4 is 1</a:t>
+            </a:r>
+            <a:r>
+              <a:rPr lang="en-US" sz="1600" dirty="0"/>
+              <a:t>.</a:t>
+            </a:r>
+            <a:endParaRPr lang="en-US" sz="1600" dirty="0">
+              <a:cs typeface="Lucida Sans Unicode" panose="020B0602030504020204" pitchFamily="34" charset="0"/>
+            </a:endParaRPr>
+          </a:p>
+          <a:p>
+            <a:pPr>
+              <a:spcBef>
+                <a:spcPts val="0"/>
+              </a:spcBef>
+            </a:pPr>
+            <a:r>
+              <a:rPr lang="en-US" sz="1800" b="1" dirty="0">
+                <a:solidFill>
+                  <a:srgbClr val="0000FF"/>
+                </a:solidFill>
+                <a:cs typeface="Lucida Sans Unicode" panose="020B0602030504020204" pitchFamily="34" charset="0"/>
+              </a:rPr>
+              <a:t>Energy</a:t>
+            </a:r>
+            <a:r>
+              <a:rPr lang="en-US" sz="1600" dirty="0">
+                <a:cs typeface="Lucida Sans Unicode" panose="020B0602030504020204" pitchFamily="34" charset="0"/>
+              </a:rPr>
+              <a:t> - </a:t>
+            </a:r>
+            <a:r>
+              <a:rPr lang="en-US" sz="1600" dirty="0"/>
+              <a:t>Energy is a measure from 0.0 to 1.0 and represents a perceptual measure of intensity and activity. Energetic tracks feel fast, loud, and noisy. </a:t>
+            </a:r>
+            <a:endParaRPr lang="en-US" sz="1600" dirty="0">
+              <a:cs typeface="Lucida Sans Unicode" panose="020B0602030504020204" pitchFamily="34" charset="0"/>
+            </a:endParaRPr>
+          </a:p>
+          <a:p>
+            <a:pPr>
+              <a:spcBef>
+                <a:spcPts val="0"/>
+              </a:spcBef>
+            </a:pPr>
+            <a:r>
+              <a:rPr lang="en-US" sz="1800" b="1" dirty="0">
+                <a:solidFill>
+                  <a:srgbClr val="0000FF"/>
+                </a:solidFill>
+                <a:cs typeface="Lucida Sans Unicode" panose="020B0602030504020204" pitchFamily="34" charset="0"/>
+              </a:rPr>
+              <a:t>Instrumentalness</a:t>
+            </a:r>
+            <a:r>
+              <a:rPr lang="en-US" sz="1600" dirty="0">
+                <a:cs typeface="Lucida Sans Unicode" panose="020B0602030504020204" pitchFamily="34" charset="0"/>
+              </a:rPr>
+              <a:t> – </a:t>
+            </a:r>
+            <a:r>
+              <a:rPr lang="en-US" sz="1600" dirty="0"/>
+              <a:t>The closer the instrumentalness value is to 1.0, the greater likelihood the track contains no vocal content. </a:t>
+            </a:r>
+          </a:p>
+          <a:p>
+            <a:pPr>
+              <a:spcBef>
+                <a:spcPts val="0"/>
+              </a:spcBef>
+            </a:pPr>
+            <a:r>
+              <a:rPr lang="en-US" sz="1800" b="1" dirty="0">
+                <a:solidFill>
+                  <a:srgbClr val="0000FF"/>
+                </a:solidFill>
+                <a:cs typeface="Lucida Sans Unicode" panose="020B0602030504020204" pitchFamily="34" charset="0"/>
+              </a:rPr>
+              <a:t>Liveness</a:t>
+            </a:r>
+            <a:r>
+              <a:rPr lang="en-US" sz="1600" dirty="0">
+                <a:cs typeface="Lucida Sans Unicode" panose="020B0602030504020204" pitchFamily="34" charset="0"/>
+              </a:rPr>
+              <a:t> - </a:t>
+            </a:r>
+            <a:r>
+              <a:rPr lang="en-US" sz="1600" dirty="0"/>
+              <a:t>Detects if the recording is live with an audience. A value closer to 1 has a strong likelihood that the track is live. </a:t>
+            </a:r>
+            <a:endParaRPr lang="en-US" sz="1600" dirty="0">
+              <a:cs typeface="Lucida Sans Unicode" panose="020B0602030504020204" pitchFamily="34" charset="0"/>
+            </a:endParaRPr>
+          </a:p>
+          <a:p>
+            <a:pPr>
+              <a:spcBef>
+                <a:spcPts val="0"/>
+              </a:spcBef>
+            </a:pPr>
+            <a:r>
+              <a:rPr lang="en-US" sz="1800" b="1" dirty="0">
+                <a:cs typeface="Lucida Sans Unicode" panose="020B0602030504020204" pitchFamily="34" charset="0"/>
+              </a:rPr>
+              <a:t>Loudness</a:t>
+            </a:r>
+            <a:r>
+              <a:rPr lang="en-US" sz="1600" dirty="0">
+                <a:cs typeface="Lucida Sans Unicode" panose="020B0602030504020204" pitchFamily="34" charset="0"/>
+              </a:rPr>
+              <a:t> - </a:t>
+            </a:r>
+            <a:r>
+              <a:rPr lang="en-US" sz="1600" dirty="0"/>
+              <a:t>The higher the value, the louder the song. A measure from </a:t>
+            </a:r>
+            <a:r>
+              <a:rPr lang="en-US" sz="1600" dirty="0">
+                <a:solidFill>
+                  <a:srgbClr val="FF0000"/>
+                </a:solidFill>
+              </a:rPr>
+              <a:t>0 - -60</a:t>
+            </a:r>
+            <a:r>
+              <a:rPr lang="en-US" sz="1600" dirty="0"/>
+              <a:t>.</a:t>
+            </a:r>
+            <a:endParaRPr lang="en-US" sz="1600" dirty="0">
+              <a:cs typeface="Lucida Sans Unicode" panose="020B0602030504020204" pitchFamily="34" charset="0"/>
+            </a:endParaRPr>
+          </a:p>
+          <a:p>
+            <a:pPr>
+              <a:spcBef>
+                <a:spcPts val="0"/>
+              </a:spcBef>
+            </a:pPr>
+            <a:r>
+              <a:rPr lang="en-US" sz="1800" b="1" dirty="0">
+                <a:solidFill>
+                  <a:srgbClr val="0000FF"/>
+                </a:solidFill>
+                <a:cs typeface="Lucida Sans Unicode" panose="020B0602030504020204" pitchFamily="34" charset="0"/>
+              </a:rPr>
+              <a:t>Mode</a:t>
+            </a:r>
+            <a:r>
+              <a:rPr lang="en-US" sz="1800" b="1" dirty="0">
+                <a:cs typeface="Lucida Sans Unicode" panose="020B0602030504020204" pitchFamily="34" charset="0"/>
+              </a:rPr>
+              <a:t> - </a:t>
+            </a:r>
+            <a:r>
+              <a:rPr lang="en-US" sz="1600" dirty="0">
+                <a:cs typeface="Lucida Sans Unicode" panose="020B0602030504020204" pitchFamily="34" charset="0"/>
+              </a:rPr>
+              <a:t>T</a:t>
+            </a:r>
+            <a:r>
+              <a:rPr lang="en-US" sz="1600" dirty="0"/>
+              <a:t>he modality of a track, the type of scale from which its melodic content is derived. Major is 1 and minor is 0.</a:t>
+            </a:r>
+            <a:endParaRPr lang="en-US" sz="1600" b="1" dirty="0">
+              <a:cs typeface="Lucida Sans Unicode" panose="020B0602030504020204" pitchFamily="34" charset="0"/>
+            </a:endParaRPr>
+          </a:p>
+          <a:p>
+            <a:pPr>
+              <a:spcBef>
+                <a:spcPts val="0"/>
+              </a:spcBef>
+            </a:pPr>
+            <a:r>
+              <a:rPr lang="en-US" sz="1800" b="1" dirty="0">
+                <a:cs typeface="Lucida Sans Unicode" panose="020B0602030504020204" pitchFamily="34" charset="0"/>
+              </a:rPr>
+              <a:t>Popularity</a:t>
+            </a:r>
+            <a:r>
+              <a:rPr lang="en-US" sz="1600" dirty="0">
+                <a:cs typeface="Lucida Sans Unicode" panose="020B0602030504020204" pitchFamily="34" charset="0"/>
+              </a:rPr>
+              <a:t> - </a:t>
+            </a:r>
+            <a:r>
+              <a:rPr lang="en-US" sz="1600" dirty="0"/>
+              <a:t>The higher the value the more popular the song is. A measure from </a:t>
+            </a:r>
+            <a:r>
+              <a:rPr lang="en-US" sz="1600" dirty="0">
+                <a:solidFill>
+                  <a:srgbClr val="FF0000"/>
+                </a:solidFill>
+              </a:rPr>
+              <a:t>1 - 100</a:t>
+            </a:r>
+            <a:r>
+              <a:rPr lang="en-US" sz="1600" dirty="0"/>
+              <a:t>.</a:t>
+            </a:r>
+            <a:endParaRPr lang="en-US" sz="1600" dirty="0">
+              <a:cs typeface="Lucida Sans Unicode" panose="020B0602030504020204" pitchFamily="34" charset="0"/>
+            </a:endParaRPr>
+          </a:p>
+          <a:p>
+            <a:pPr>
+              <a:spcBef>
+                <a:spcPts val="0"/>
+              </a:spcBef>
+            </a:pPr>
+            <a:r>
+              <a:rPr lang="en-US" sz="1800" b="1" dirty="0">
+                <a:solidFill>
+                  <a:srgbClr val="0000FF"/>
+                </a:solidFill>
+                <a:cs typeface="Lucida Sans Unicode" panose="020B0602030504020204" pitchFamily="34" charset="0"/>
+              </a:rPr>
+              <a:t>Speechiness</a:t>
+            </a:r>
+            <a:r>
+              <a:rPr lang="en-US" sz="1800" b="1" dirty="0">
+                <a:cs typeface="Lucida Sans Unicode" panose="020B0602030504020204" pitchFamily="34" charset="0"/>
+              </a:rPr>
+              <a:t> </a:t>
+            </a:r>
+            <a:r>
+              <a:rPr lang="en-US" sz="1600" dirty="0">
+                <a:cs typeface="Lucida Sans Unicode" panose="020B0602030504020204" pitchFamily="34" charset="0"/>
+              </a:rPr>
+              <a:t>- </a:t>
+            </a:r>
+            <a:r>
+              <a:rPr lang="en-US" sz="1600" dirty="0"/>
+              <a:t>Speechiness detects the presence of spoken words in a track. Values between 0.33 and 0.66 describe tracks that may contain both music and speech, including such cases as rap music. The closer the value is to 1 the probability it is entirely spoken word.</a:t>
+            </a:r>
+            <a:endParaRPr lang="en-US" sz="1600" dirty="0">
+              <a:cs typeface="Lucida Sans Unicode" panose="020B0602030504020204" pitchFamily="34" charset="0"/>
+            </a:endParaRPr>
+          </a:p>
+          <a:p>
+            <a:pPr>
+              <a:spcBef>
+                <a:spcPts val="0"/>
+              </a:spcBef>
+            </a:pPr>
+            <a:r>
+              <a:rPr lang="en-US" sz="1800" b="1" dirty="0">
+                <a:cs typeface="Lucida Sans Unicode" panose="020B0602030504020204" pitchFamily="34" charset="0"/>
+              </a:rPr>
+              <a:t>Tempo</a:t>
+            </a:r>
+            <a:r>
+              <a:rPr lang="en-US" sz="1600" dirty="0">
+                <a:cs typeface="Lucida Sans Unicode" panose="020B0602030504020204" pitchFamily="34" charset="0"/>
+              </a:rPr>
+              <a:t> - </a:t>
+            </a:r>
+            <a:r>
+              <a:rPr lang="en-US" sz="1600" dirty="0"/>
+              <a:t>The overall estimated tempo of a track in beats per minute (BPM). A measure from </a:t>
+            </a:r>
+            <a:r>
+              <a:rPr lang="en-US" sz="1600" dirty="0">
+                <a:solidFill>
+                  <a:srgbClr val="FF0000"/>
+                </a:solidFill>
+              </a:rPr>
+              <a:t>0 - 250</a:t>
+            </a:r>
+            <a:r>
+              <a:rPr lang="en-US" sz="1600" dirty="0"/>
+              <a:t>.</a:t>
+            </a:r>
+          </a:p>
+          <a:p>
+            <a:pPr>
+              <a:spcBef>
+                <a:spcPts val="0"/>
+              </a:spcBef>
+            </a:pPr>
+            <a:r>
+              <a:rPr lang="en-US" sz="1800" b="1" dirty="0">
+                <a:cs typeface="Lucida Sans Unicode" panose="020B0602030504020204" pitchFamily="34" charset="0"/>
+              </a:rPr>
+              <a:t>Time Signature – </a:t>
+            </a:r>
+            <a:r>
+              <a:rPr lang="en-US" sz="1600" dirty="0">
+                <a:cs typeface="Lucida Sans Unicode" panose="020B0602030504020204" pitchFamily="34" charset="0"/>
+              </a:rPr>
+              <a:t>S</a:t>
+            </a:r>
+            <a:r>
+              <a:rPr lang="en-US" sz="1600" dirty="0"/>
+              <a:t>pecifies how many beats are in each bar (or measure). A measure from </a:t>
+            </a:r>
+            <a:r>
+              <a:rPr lang="en-US" sz="1600" dirty="0">
+                <a:solidFill>
+                  <a:srgbClr val="FF0000"/>
+                </a:solidFill>
+              </a:rPr>
+              <a:t>0 - 5</a:t>
+            </a:r>
+            <a:r>
+              <a:rPr lang="en-US" sz="1600" dirty="0"/>
+              <a:t>.</a:t>
+            </a:r>
+            <a:endParaRPr lang="en-US" sz="1600" b="1" dirty="0">
+              <a:cs typeface="Lucida Sans Unicode" panose="020B0602030504020204" pitchFamily="34" charset="0"/>
+            </a:endParaRPr>
+          </a:p>
+          <a:p>
+            <a:pPr>
+              <a:spcBef>
+                <a:spcPts val="0"/>
+              </a:spcBef>
+            </a:pPr>
+            <a:r>
+              <a:rPr lang="en-US" sz="1800" b="1" dirty="0">
+                <a:solidFill>
+                  <a:srgbClr val="0000FF"/>
+                </a:solidFill>
+                <a:cs typeface="Lucida Sans Unicode" panose="020B0602030504020204" pitchFamily="34" charset="0"/>
+              </a:rPr>
+              <a:t>Valence</a:t>
+            </a:r>
+            <a:r>
+              <a:rPr lang="en-US" sz="1800" b="1" dirty="0">
+                <a:cs typeface="Lucida Sans Unicode" panose="020B0602030504020204" pitchFamily="34" charset="0"/>
+              </a:rPr>
+              <a:t> </a:t>
+            </a:r>
+            <a:r>
+              <a:rPr lang="en-US" sz="1600" dirty="0">
+                <a:cs typeface="Lucida Sans Unicode" panose="020B0602030504020204" pitchFamily="34" charset="0"/>
+              </a:rPr>
+              <a:t>- </a:t>
+            </a:r>
+            <a:r>
+              <a:rPr lang="en-US" sz="1600" dirty="0"/>
+              <a:t>A measure from 0.0 to 1.0 describing the musical positiveness conveyed by a track. Tracks with a value closer to 1 sound more positive while tracks with a value closer to 0 sound more negative.</a:t>
+            </a:r>
+          </a:p>
+          <a:p>
+            <a:pPr>
+              <a:spcBef>
+                <a:spcPts val="0"/>
+              </a:spcBef>
+            </a:pPr>
+            <a:endParaRPr lang="en-US" sz="1600" dirty="0">
+              <a:cs typeface="Lucida Sans Unicode" panose="020B0602030504020204" pitchFamily="34" charset="0"/>
+            </a:endParaRPr>
+          </a:p>
+          <a:p>
+            <a:pPr>
+              <a:spcBef>
+                <a:spcPts val="0"/>
+              </a:spcBef>
+            </a:pPr>
+            <a:r>
+              <a:rPr lang="en-US" sz="1600" dirty="0">
+                <a:cs typeface="Lucida Sans Unicode" panose="020B0602030504020204" pitchFamily="34" charset="0"/>
+                <a:hlinkClick r:id="rId3"/>
+              </a:rPr>
+              <a:t>https://developer.spotify.com/documentation/web-api/reference/tracks/get-several-audio-features/</a:t>
+            </a:r>
+            <a:endParaRPr lang="en-US" sz="1600" dirty="0">
+              <a:cs typeface="Lucida Sans Unicode" panose="020B0602030504020204" pitchFamily="34" charset="0"/>
+            </a:endParaRPr>
+          </a:p>
+          <a:p>
+            <a:pPr>
+              <a:spcBef>
+                <a:spcPts val="0"/>
+              </a:spcBef>
+            </a:pPr>
+            <a:endParaRPr lang="en-US" sz="1600" dirty="0">
+              <a:cs typeface="Lucida Sans Unicode" panose="020B0602030504020204" pitchFamily="34" charset="0"/>
+            </a:endParaRPr>
+          </a:p>
+        </p:txBody>
+      </p:sp>
+      <p:sp>
+        <p:nvSpPr>
+          <p:cNvPr id="10" name="Rectangle 9">
+            <a:extLst>
+              <a:ext uri="{FF2B5EF4-FFF2-40B4-BE49-F238E27FC236}">
+                <a16:creationId xmlns:a16="http://schemas.microsoft.com/office/drawing/2014/main" id="{2E80C965-DB6D-4F81-9E9E-B027384D0BD6}"/>
+              </a:ext>
+              <a:ext uri="{C183D7F6-B498-43B3-948B-1728B52AA6E4}">
+                <adec:decorative xmlns:adec="http://schemas.microsoft.com/office/drawing/2017/decorative" val="1"/>
+              </a:ext>
+            </a:extLst>
+          </p:cNvPr>
+          <p:cNvSpPr>
+            <a:spLocks noGrp="1" noRot="1" noChangeAspect="1" noMove="1" noResize="1" noEditPoints="1" noAdjustHandles="1" noChangeArrowheads="1" noChangeShapeType="1" noTextEdit="1"/>
+          </p:cNvSpPr>
+          <p:nvPr>
+            <p:extLst>
+              <p:ext uri="{386F3935-93C4-4BCD-93E2-E3B085C9AB24}">
+                <p16:designElem xmlns:p16="http://schemas.microsoft.com/office/powerpoint/2015/main" val="1"/>
+              </p:ext>
+            </p:extLst>
+          </p:nvPr>
+        </p:nvSpPr>
+        <p:spPr>
+          <a:xfrm rot="2700000">
+            <a:off x="11052629" y="2120024"/>
+            <a:ext cx="645368" cy="645368"/>
+          </a:xfrm>
+          <a:prstGeom prst="rect">
+            <a:avLst/>
+          </a:prstGeom>
+          <a:solidFill>
+            <a:schemeClr val="accent4">
+              <a:alpha val="30000"/>
+            </a:schemeClr>
+          </a:solidFill>
+          <a:ln>
+            <a:noFill/>
+          </a:ln>
+        </p:spPr>
+        <p:style>
+          <a:lnRef idx="2">
+            <a:schemeClr val="accent1">
+              <a:shade val="50000"/>
+            </a:schemeClr>
+          </a:lnRef>
+          <a:fillRef idx="1">
+            <a:schemeClr val="accent1"/>
+          </a:fillRef>
+          <a:effectRef idx="0">
+            <a:schemeClr val="accent1"/>
+          </a:effectRef>
+          <a:fontRef idx="minor">
+            <a:schemeClr val="lt1"/>
+          </a:fontRef>
+        </p:style>
+        <p:txBody>
+          <a:bodyPr rtlCol="0" anchor="ctr"/>
+          <a:lstStyle/>
+          <a:p>
+            <a:pPr algn="ctr"/>
+            <a:endParaRPr lang="en-US">
+              <a:latin typeface="Lucida Sans Unicode" panose="020B0602030504020204" pitchFamily="34" charset="0"/>
+              <a:cs typeface="Lucida Sans Unicode" panose="020B0602030504020204" pitchFamily="34" charset="0"/>
+            </a:endParaRPr>
+          </a:p>
+        </p:txBody>
+      </p:sp>
+      <p:sp>
+        <p:nvSpPr>
+          <p:cNvPr id="12" name="Isosceles Triangle 11">
+            <a:extLst>
+              <a:ext uri="{FF2B5EF4-FFF2-40B4-BE49-F238E27FC236}">
+                <a16:creationId xmlns:a16="http://schemas.microsoft.com/office/drawing/2014/main" id="{A580F890-B085-4E95-96AA-55AEBEC5CE6E}"/>
+              </a:ext>
+              <a:ext uri="{C183D7F6-B498-43B3-948B-1728B52AA6E4}">
+                <adec:decorative xmlns:adec="http://schemas.microsoft.com/office/drawing/2017/decorative" val="1"/>
+              </a:ext>
+            </a:extLst>
+          </p:cNvPr>
+          <p:cNvSpPr>
+            <a:spLocks noGrp="1" noRot="1" noChangeAspect="1" noMove="1" noResize="1" noEditPoints="1" noAdjustHandles="1" noChangeArrowheads="1" noChangeShapeType="1" noTextEdit="1"/>
+          </p:cNvSpPr>
+          <p:nvPr>
+            <p:extLst>
+              <p:ext uri="{386F3935-93C4-4BCD-93E2-E3B085C9AB24}">
+                <p16:designElem xmlns:p16="http://schemas.microsoft.com/office/powerpoint/2015/main" val="1"/>
+              </p:ext>
+            </p:extLst>
+          </p:nvPr>
+        </p:nvSpPr>
+        <p:spPr>
+          <a:xfrm rot="16200000">
+            <a:off x="10289068" y="1343027"/>
+            <a:ext cx="2532832" cy="1273032"/>
+          </a:xfrm>
+          <a:prstGeom prst="triangle">
+            <a:avLst>
+              <a:gd name="adj" fmla="val 50000"/>
+            </a:avLst>
+          </a:prstGeom>
+          <a:solidFill>
+            <a:schemeClr val="accent4">
+              <a:alpha val="30000"/>
+            </a:schemeClr>
+          </a:solidFill>
+          <a:ln>
+            <a:noFill/>
+          </a:ln>
+        </p:spPr>
+        <p:style>
+          <a:lnRef idx="2">
+            <a:schemeClr val="accent1">
+              <a:shade val="50000"/>
+            </a:schemeClr>
+          </a:lnRef>
+          <a:fillRef idx="1">
+            <a:schemeClr val="accent1"/>
+          </a:fillRef>
+          <a:effectRef idx="0">
+            <a:schemeClr val="accent1"/>
+          </a:effectRef>
+          <a:fontRef idx="minor">
+            <a:schemeClr val="lt1"/>
+          </a:fontRef>
+        </p:style>
+        <p:txBody>
+          <a:bodyPr rtlCol="0" anchor="ctr"/>
+          <a:lstStyle/>
+          <a:p>
+            <a:pPr algn="ctr"/>
+            <a:endParaRPr lang="en-US">
+              <a:latin typeface="Lucida Sans Unicode" panose="020B0602030504020204" pitchFamily="34" charset="0"/>
+              <a:cs typeface="Lucida Sans Unicode" panose="020B0602030504020204" pitchFamily="34" charset="0"/>
+            </a:endParaRPr>
+          </a:p>
+        </p:txBody>
+      </p:sp>
+      <p:sp>
+        <p:nvSpPr>
+          <p:cNvPr id="14" name="Isosceles Triangle 13">
+            <a:extLst>
+              <a:ext uri="{FF2B5EF4-FFF2-40B4-BE49-F238E27FC236}">
+                <a16:creationId xmlns:a16="http://schemas.microsoft.com/office/drawing/2014/main" id="{D3F51FEB-38FB-4F6C-9F7B-2F2AFAB65463}"/>
+              </a:ext>
+              <a:ext uri="{C183D7F6-B498-43B3-948B-1728B52AA6E4}">
+                <adec:decorative xmlns:adec="http://schemas.microsoft.com/office/drawing/2017/decorative" val="1"/>
+              </a:ext>
+            </a:extLst>
+          </p:cNvPr>
+          <p:cNvSpPr>
+            <a:spLocks noGrp="1" noRot="1" noChangeAspect="1" noMove="1" noResize="1" noEditPoints="1" noAdjustHandles="1" noChangeArrowheads="1" noChangeShapeType="1" noTextEdit="1"/>
+          </p:cNvSpPr>
+          <p:nvPr>
+            <p:extLst>
+              <p:ext uri="{386F3935-93C4-4BCD-93E2-E3B085C9AB24}">
+                <p16:designElem xmlns:p16="http://schemas.microsoft.com/office/powerpoint/2015/main" val="1"/>
+              </p:ext>
+            </p:extLst>
+          </p:nvPr>
+        </p:nvSpPr>
+        <p:spPr>
+          <a:xfrm rot="5400000">
+            <a:off x="-501760" y="5103257"/>
+            <a:ext cx="2017580" cy="1014060"/>
+          </a:xfrm>
+          <a:prstGeom prst="triangle">
+            <a:avLst>
+              <a:gd name="adj" fmla="val 50000"/>
+            </a:avLst>
+          </a:prstGeom>
+          <a:solidFill>
+            <a:schemeClr val="accent1">
+              <a:alpha val="30000"/>
+            </a:schemeClr>
+          </a:solidFill>
+          <a:ln>
+            <a:noFill/>
+          </a:ln>
+        </p:spPr>
+        <p:style>
+          <a:lnRef idx="2">
+            <a:schemeClr val="accent1">
+              <a:shade val="50000"/>
+            </a:schemeClr>
+          </a:lnRef>
+          <a:fillRef idx="1">
+            <a:schemeClr val="accent1"/>
+          </a:fillRef>
+          <a:effectRef idx="0">
+            <a:schemeClr val="accent1"/>
+          </a:effectRef>
+          <a:fontRef idx="minor">
+            <a:schemeClr val="lt1"/>
+          </a:fontRef>
+        </p:style>
+        <p:txBody>
+          <a:bodyPr wrap="square" rtlCol="0" anchor="ctr">
+            <a:noAutofit/>
+          </a:bodyPr>
+          <a:lstStyle/>
+          <a:p>
+            <a:pPr algn="ctr"/>
+            <a:endParaRPr lang="en-US">
+              <a:latin typeface="Lucida Sans Unicode" panose="020B0602030504020204" pitchFamily="34" charset="0"/>
+              <a:cs typeface="Lucida Sans Unicode" panose="020B0602030504020204" pitchFamily="34" charset="0"/>
+            </a:endParaRPr>
+          </a:p>
+        </p:txBody>
+      </p:sp>
+      <p:sp>
+        <p:nvSpPr>
+          <p:cNvPr id="16" name="Rectangle 15">
+            <a:extLst>
+              <a:ext uri="{FF2B5EF4-FFF2-40B4-BE49-F238E27FC236}">
+                <a16:creationId xmlns:a16="http://schemas.microsoft.com/office/drawing/2014/main" id="{1E547BA6-BAE0-43BB-A7CA-60F69CE252F0}"/>
+              </a:ext>
+              <a:ext uri="{C183D7F6-B498-43B3-948B-1728B52AA6E4}">
+                <adec:decorative xmlns:adec="http://schemas.microsoft.com/office/drawing/2017/decorative" val="1"/>
+              </a:ext>
+            </a:extLst>
+          </p:cNvPr>
+          <p:cNvSpPr>
+            <a:spLocks noGrp="1" noRot="1" noChangeAspect="1" noMove="1" noResize="1" noEditPoints="1" noAdjustHandles="1" noChangeArrowheads="1" noChangeShapeType="1" noTextEdit="1"/>
+          </p:cNvSpPr>
+          <p:nvPr>
+            <p:extLst>
+              <p:ext uri="{386F3935-93C4-4BCD-93E2-E3B085C9AB24}">
+                <p16:designElem xmlns:p16="http://schemas.microsoft.com/office/powerpoint/2015/main" val="1"/>
+              </p:ext>
+            </p:extLst>
+          </p:nvPr>
+        </p:nvSpPr>
+        <p:spPr>
+          <a:xfrm rot="2700000">
+            <a:off x="427916" y="5728708"/>
+            <a:ext cx="485578" cy="485578"/>
+          </a:xfrm>
+          <a:prstGeom prst="rect">
+            <a:avLst/>
+          </a:prstGeom>
+          <a:solidFill>
+            <a:schemeClr val="accent1">
+              <a:alpha val="30000"/>
+            </a:schemeClr>
+          </a:solidFill>
+          <a:ln>
+            <a:noFill/>
+          </a:ln>
+        </p:spPr>
+        <p:style>
+          <a:lnRef idx="2">
+            <a:schemeClr val="accent1">
+              <a:shade val="50000"/>
+            </a:schemeClr>
+          </a:lnRef>
+          <a:fillRef idx="1">
+            <a:schemeClr val="accent1"/>
+          </a:fillRef>
+          <a:effectRef idx="0">
+            <a:schemeClr val="accent1"/>
+          </a:effectRef>
+          <a:fontRef idx="minor">
+            <a:schemeClr val="lt1"/>
+          </a:fontRef>
+        </p:style>
+        <p:txBody>
+          <a:bodyPr wrap="square" rtlCol="0" anchor="ctr">
+            <a:noAutofit/>
+          </a:bodyPr>
+          <a:lstStyle/>
+          <a:p>
+            <a:pPr algn="ctr"/>
+            <a:endParaRPr lang="en-US">
+              <a:latin typeface="Lucida Sans Unicode" panose="020B0602030504020204" pitchFamily="34" charset="0"/>
+              <a:cs typeface="Lucida Sans Unicode" panose="020B0602030504020204" pitchFamily="34" charset="0"/>
+            </a:endParaRPr>
+          </a:p>
+        </p:txBody>
+      </p:sp>
+    </p:spTree>
+    <p:extLst>
+      <p:ext uri="{BB962C8B-B14F-4D97-AF65-F5344CB8AC3E}">
         <p14:creationId xmlns:p14="http://schemas.microsoft.com/office/powerpoint/2010/main" val="2649749720"/>
       </p:ext>
     </p:extLst>
@@ -6980,7 +7918,7 @@
 </p:sld>
 </file>
 
-<file path=ppt/slides/slide5.xml><?xml version="1.0" encoding="utf-8"?>
+<file path=ppt/slides/slide6.xml><?xml version="1.0" encoding="utf-8"?>
 <p:sld xmlns:a="http://schemas.openxmlformats.org/drawingml/2006/main" xmlns:r="http://schemas.openxmlformats.org/officeDocument/2006/relationships" xmlns:p="http://schemas.openxmlformats.org/presentationml/2006/main">
   <p:cSld>
     <p:bg>

</xml_diff>

<commit_message>
Ben, Ayan, Miri, Sarah, Umar & my HTML updates
</commit_message>
<xml_diff>
--- a/Project_3.pptx
+++ b/Project_3.pptx
@@ -202,7 +202,7 @@
           <a:p>
             <a:fld id="{D787FA33-36A0-4BA6-AA24-14202E5CC49F}" type="datetimeFigureOut">
               <a:rPr lang="en-US" smtClean="0"/>
-              <a:t>10/15/2020</a:t>
+              <a:t>10/20/2020</a:t>
             </a:fld>
             <a:endParaRPr lang="en-US"/>
           </a:p>
@@ -1120,7 +1120,7 @@
           <a:p>
             <a:fld id="{76390919-E38A-43AC-80A0-C781043285AC}" type="datetimeFigureOut">
               <a:rPr lang="en-US" smtClean="0"/>
-              <a:t>10/15/2020</a:t>
+              <a:t>10/20/2020</a:t>
             </a:fld>
             <a:endParaRPr lang="en-US"/>
           </a:p>
@@ -1318,7 +1318,7 @@
           <a:p>
             <a:fld id="{76390919-E38A-43AC-80A0-C781043285AC}" type="datetimeFigureOut">
               <a:rPr lang="en-US" smtClean="0"/>
-              <a:t>10/15/2020</a:t>
+              <a:t>10/20/2020</a:t>
             </a:fld>
             <a:endParaRPr lang="en-US"/>
           </a:p>
@@ -1526,7 +1526,7 @@
           <a:p>
             <a:fld id="{76390919-E38A-43AC-80A0-C781043285AC}" type="datetimeFigureOut">
               <a:rPr lang="en-US" smtClean="0"/>
-              <a:t>10/15/2020</a:t>
+              <a:t>10/20/2020</a:t>
             </a:fld>
             <a:endParaRPr lang="en-US"/>
           </a:p>
@@ -1724,7 +1724,7 @@
           <a:p>
             <a:fld id="{76390919-E38A-43AC-80A0-C781043285AC}" type="datetimeFigureOut">
               <a:rPr lang="en-US" smtClean="0"/>
-              <a:t>10/15/2020</a:t>
+              <a:t>10/20/2020</a:t>
             </a:fld>
             <a:endParaRPr lang="en-US"/>
           </a:p>
@@ -1999,7 +1999,7 @@
           <a:p>
             <a:fld id="{76390919-E38A-43AC-80A0-C781043285AC}" type="datetimeFigureOut">
               <a:rPr lang="en-US" smtClean="0"/>
-              <a:t>10/15/2020</a:t>
+              <a:t>10/20/2020</a:t>
             </a:fld>
             <a:endParaRPr lang="en-US"/>
           </a:p>
@@ -2264,7 +2264,7 @@
           <a:p>
             <a:fld id="{76390919-E38A-43AC-80A0-C781043285AC}" type="datetimeFigureOut">
               <a:rPr lang="en-US" smtClean="0"/>
-              <a:t>10/15/2020</a:t>
+              <a:t>10/20/2020</a:t>
             </a:fld>
             <a:endParaRPr lang="en-US"/>
           </a:p>
@@ -2676,7 +2676,7 @@
           <a:p>
             <a:fld id="{76390919-E38A-43AC-80A0-C781043285AC}" type="datetimeFigureOut">
               <a:rPr lang="en-US" smtClean="0"/>
-              <a:t>10/15/2020</a:t>
+              <a:t>10/20/2020</a:t>
             </a:fld>
             <a:endParaRPr lang="en-US"/>
           </a:p>
@@ -2817,7 +2817,7 @@
           <a:p>
             <a:fld id="{76390919-E38A-43AC-80A0-C781043285AC}" type="datetimeFigureOut">
               <a:rPr lang="en-US" smtClean="0"/>
-              <a:t>10/15/2020</a:t>
+              <a:t>10/20/2020</a:t>
             </a:fld>
             <a:endParaRPr lang="en-US"/>
           </a:p>
@@ -2930,7 +2930,7 @@
           <a:p>
             <a:fld id="{76390919-E38A-43AC-80A0-C781043285AC}" type="datetimeFigureOut">
               <a:rPr lang="en-US" smtClean="0"/>
-              <a:t>10/15/2020</a:t>
+              <a:t>10/20/2020</a:t>
             </a:fld>
             <a:endParaRPr lang="en-US"/>
           </a:p>
@@ -3241,7 +3241,7 @@
           <a:p>
             <a:fld id="{76390919-E38A-43AC-80A0-C781043285AC}" type="datetimeFigureOut">
               <a:rPr lang="en-US" smtClean="0"/>
-              <a:t>10/15/2020</a:t>
+              <a:t>10/20/2020</a:t>
             </a:fld>
             <a:endParaRPr lang="en-US"/>
           </a:p>
@@ -3529,7 +3529,7 @@
           <a:p>
             <a:fld id="{76390919-E38A-43AC-80A0-C781043285AC}" type="datetimeFigureOut">
               <a:rPr lang="en-US" smtClean="0"/>
-              <a:t>10/15/2020</a:t>
+              <a:t>10/20/2020</a:t>
             </a:fld>
             <a:endParaRPr lang="en-US"/>
           </a:p>
@@ -3770,7 +3770,7 @@
           <a:p>
             <a:fld id="{76390919-E38A-43AC-80A0-C781043285AC}" type="datetimeFigureOut">
               <a:rPr lang="en-US" smtClean="0"/>
-              <a:t>10/15/2020</a:t>
+              <a:t>10/20/2020</a:t>
             </a:fld>
             <a:endParaRPr lang="en-US"/>
           </a:p>
@@ -5183,13 +5183,13 @@
               <a:buNone/>
             </a:pPr>
             <a:r>
-              <a:rPr lang="en-US" sz="1400" b="1" dirty="0">
+              <a:rPr lang="en-US" sz="1600" b="1" dirty="0">
                 <a:latin typeface="Lucida Sans Typewriter" panose="020B0509030504030204" pitchFamily="49" charset="0"/>
               </a:rPr>
               <a:t>Topic</a:t>
             </a:r>
             <a:r>
-              <a:rPr lang="en-US" sz="1400" dirty="0">
+              <a:rPr lang="en-US" sz="1600" dirty="0">
                 <a:latin typeface="Lucida Sans Typewriter" panose="020B0509030504030204" pitchFamily="49" charset="0"/>
               </a:rPr>
               <a:t>: Billboard Analysis</a:t>
@@ -5199,7 +5199,7 @@
             <a:pPr marL="0" indent="0">
               <a:buNone/>
             </a:pPr>
-            <a:endParaRPr lang="en-US" sz="1400" dirty="0">
+            <a:endParaRPr lang="en-US" sz="1600" dirty="0">
               <a:latin typeface="Lucida Sans Typewriter" panose="020B0509030504030204" pitchFamily="49" charset="0"/>
             </a:endParaRPr>
           </a:p>
@@ -5208,13 +5208,13 @@
               <a:buNone/>
             </a:pPr>
             <a:r>
-              <a:rPr lang="en-US" sz="1400" b="1" dirty="0">
+              <a:rPr lang="en-US" sz="1600" b="1" dirty="0">
                 <a:latin typeface="Lucida Sans Typewriter" panose="020B0509030504030204" pitchFamily="49" charset="0"/>
               </a:rPr>
               <a:t>Datasets used</a:t>
             </a:r>
             <a:r>
-              <a:rPr lang="en-US" sz="1400" dirty="0">
+              <a:rPr lang="en-US" sz="1600" dirty="0">
                 <a:latin typeface="Lucida Sans Typewriter" panose="020B0509030504030204" pitchFamily="49" charset="0"/>
               </a:rPr>
               <a:t>: Kaggle</a:t>
@@ -5224,7 +5224,7 @@
             <a:pPr marL="0" indent="0">
               <a:buNone/>
             </a:pPr>
-            <a:endParaRPr lang="en-US" sz="1400" dirty="0">
+            <a:endParaRPr lang="en-US" sz="1600" dirty="0">
               <a:latin typeface="Lucida Sans Typewriter" panose="020B0509030504030204" pitchFamily="49" charset="0"/>
             </a:endParaRPr>
           </a:p>
@@ -5233,13 +5233,13 @@
               <a:buNone/>
             </a:pPr>
             <a:r>
-              <a:rPr lang="en-US" sz="1400" b="1" dirty="0">
+              <a:rPr lang="en-US" sz="1600" b="1" dirty="0">
                 <a:latin typeface="Lucida Sans Typewriter" panose="020B0509030504030204" pitchFamily="49" charset="0"/>
               </a:rPr>
               <a:t>Inspired by</a:t>
             </a:r>
             <a:r>
-              <a:rPr lang="en-US" sz="1400" dirty="0">
+              <a:rPr lang="en-US" sz="1600" dirty="0">
                 <a:latin typeface="Lucida Sans Typewriter" panose="020B0509030504030204" pitchFamily="49" charset="0"/>
               </a:rPr>
               <a:t>: Potential back-up careers in Rap</a:t>
@@ -5249,7 +5249,7 @@
             <a:pPr marL="0" indent="0">
               <a:buNone/>
             </a:pPr>
-            <a:endParaRPr lang="en-US" sz="1400" b="1" dirty="0">
+            <a:endParaRPr lang="en-US" sz="1600" dirty="0">
               <a:latin typeface="Lucida Sans Typewriter" panose="020B0509030504030204" pitchFamily="49" charset="0"/>
             </a:endParaRPr>
           </a:p>
@@ -5258,23 +5258,33 @@
               <a:buNone/>
             </a:pPr>
             <a:r>
-              <a:rPr lang="en-US" sz="1400" b="1" dirty="0">
+              <a:rPr lang="en-US" sz="1600" b="1" dirty="0">
                 <a:latin typeface="Lucida Sans Typewriter" panose="020B0509030504030204" pitchFamily="49" charset="0"/>
               </a:rPr>
-              <a:t>Visualizations</a:t>
-            </a:r>
-            <a:r>
-              <a:rPr lang="en-US" sz="1400" dirty="0">
+              <a:t>GitHub</a:t>
+            </a:r>
+            <a:r>
+              <a:rPr lang="en-US" sz="1600" dirty="0">
                 <a:latin typeface="Lucida Sans Typewriter" panose="020B0509030504030204" pitchFamily="49" charset="0"/>
               </a:rPr>
               <a:t>: </a:t>
             </a:r>
+            <a:r>
+              <a:rPr lang="en-US" sz="1600" dirty="0">
+                <a:latin typeface="Lucida Sans Typewriter" panose="020B0509030504030204" pitchFamily="49" charset="0"/>
+                <a:hlinkClick r:id="rId3"/>
+              </a:rPr>
+              <a:t>https://github.com/TheGreekGoddess/Project_3</a:t>
+            </a:r>
+            <a:endParaRPr lang="en-US" sz="1600" dirty="0">
+              <a:latin typeface="Lucida Sans Typewriter" panose="020B0509030504030204" pitchFamily="49" charset="0"/>
+            </a:endParaRPr>
           </a:p>
           <a:p>
             <a:pPr marL="0" indent="0">
               <a:buNone/>
             </a:pPr>
-            <a:endParaRPr lang="en-US" sz="1400" dirty="0">
+            <a:endParaRPr lang="en-US" sz="1600" dirty="0">
               <a:latin typeface="Lucida Sans Typewriter" panose="020B0509030504030204" pitchFamily="49" charset="0"/>
             </a:endParaRPr>
           </a:p>
@@ -5283,25 +5293,25 @@
               <a:buNone/>
             </a:pPr>
             <a:r>
-              <a:rPr lang="en-US" sz="1400" b="1" dirty="0">
+              <a:rPr lang="en-US" sz="1600" b="1" dirty="0">
                 <a:latin typeface="Lucida Sans Typewriter" panose="020B0509030504030204" pitchFamily="49" charset="0"/>
               </a:rPr>
-              <a:t>GitHub</a:t>
-            </a:r>
-            <a:r>
-              <a:rPr lang="en-US" sz="1400" dirty="0">
+              <a:t>Heroku</a:t>
+            </a:r>
+            <a:r>
+              <a:rPr lang="en-US" sz="1600" dirty="0">
                 <a:latin typeface="Lucida Sans Typewriter" panose="020B0509030504030204" pitchFamily="49" charset="0"/>
               </a:rPr>
               <a:t>: </a:t>
             </a:r>
             <a:r>
-              <a:rPr lang="en-US" sz="1400" dirty="0">
+              <a:rPr lang="en-US" sz="1600" dirty="0">
                 <a:latin typeface="Lucida Sans Typewriter" panose="020B0509030504030204" pitchFamily="49" charset="0"/>
-                <a:hlinkClick r:id="rId3"/>
-              </a:rPr>
-              <a:t>https://github.com/TheGreekGoddess/Project_3</a:t>
-            </a:r>
-            <a:endParaRPr lang="en-US" sz="1400" dirty="0">
+                <a:hlinkClick r:id="rId4"/>
+              </a:rPr>
+              <a:t>https://billboard-top-100.herokuapp.com/</a:t>
+            </a:r>
+            <a:endParaRPr lang="en-US" sz="1600" dirty="0">
               <a:latin typeface="Lucida Sans Typewriter" panose="020B0509030504030204" pitchFamily="49" charset="0"/>
             </a:endParaRPr>
           </a:p>
@@ -5500,14 +5510,11 @@
             <a:r>
               <a:rPr lang="en-US" sz="2900" dirty="0">
                 <a:solidFill>
-                  <a:srgbClr val="FFC000"/>
+                  <a:srgbClr val="00B050"/>
                 </a:solidFill>
               </a:rPr>
               <a:t>Amazon AWS</a:t>
             </a:r>
-            <a:endParaRPr lang="en-US" sz="2900" dirty="0">
-              <a:cs typeface="Lucida Sans Unicode" panose="020B0602030504020204" pitchFamily="34" charset="0"/>
-            </a:endParaRPr>
           </a:p>
           <a:p>
             <a:pPr fontAlgn="t">
@@ -5597,6 +5604,29 @@
                 </a:solidFill>
               </a:rPr>
               <a:t>Tableau</a:t>
+            </a:r>
+          </a:p>
+          <a:p>
+            <a:pPr fontAlgn="t">
+              <a:spcBef>
+                <a:spcPts val="0"/>
+              </a:spcBef>
+            </a:pPr>
+            <a:r>
+              <a:rPr lang="en-US" sz="2900" dirty="0">
+                <a:solidFill>
+                  <a:srgbClr val="00B050"/>
+                </a:solidFill>
+              </a:rPr>
+              <a:t>Excel &amp; </a:t>
+            </a:r>
+            <a:r>
+              <a:rPr lang="en-US" sz="2900" dirty="0">
+                <a:solidFill>
+                  <a:srgbClr val="FF0000"/>
+                </a:solidFill>
+              </a:rPr>
+              <a:t>VBA</a:t>
             </a:r>
           </a:p>
           <a:p>
@@ -6122,10 +6152,16 @@
               </a:spcBef>
             </a:pPr>
             <a:r>
-              <a:rPr lang="en-US" sz="1400" b="1" dirty="0">
+              <a:rPr lang="en-US" sz="2000" b="1" dirty="0">
                 <a:cs typeface="Lucida Sans Unicode" panose="020B0602030504020204" pitchFamily="34" charset="0"/>
               </a:rPr>
-              <a:t>PRIORITIES</a:t>
+              <a:t>DASHBOARD</a:t>
+            </a:r>
+            <a:r>
+              <a:rPr lang="en-US" sz="2000" dirty="0">
+                <a:cs typeface="Lucida Sans Unicode" panose="020B0602030504020204" pitchFamily="34" charset="0"/>
+              </a:rPr>
+              <a:t>:</a:t>
             </a:r>
           </a:p>
           <a:p>
@@ -6135,11 +6171,29 @@
               </a:spcBef>
             </a:pPr>
             <a:r>
-              <a:rPr lang="en-US" sz="1400" dirty="0">
+              <a:rPr lang="en-US" sz="2000" dirty="0">
                 <a:cs typeface="Lucida Sans Unicode" panose="020B0602030504020204" pitchFamily="34" charset="0"/>
               </a:rPr>
-              <a:t>Clean the attributes data and convert to percentile comparison to the rest of the dataset</a:t>
-            </a:r>
+              <a:t>"Artist's Average Attributes" – </a:t>
+            </a:r>
+            <a:r>
+              <a:rPr lang="en-US" sz="2000" b="1" dirty="0">
+                <a:cs typeface="Lucida Sans Unicode" panose="020B0602030504020204" pitchFamily="34" charset="0"/>
+              </a:rPr>
+              <a:t>Line graph </a:t>
+            </a:r>
+            <a:r>
+              <a:rPr lang="en-US" sz="2000" dirty="0">
+                <a:cs typeface="Lucida Sans Unicode" panose="020B0602030504020204" pitchFamily="34" charset="0"/>
+              </a:rPr>
+              <a:t>of the average attributes by the selected Artist</a:t>
+            </a:r>
+            <a:endParaRPr lang="en-US" sz="2000" dirty="0">
+              <a:solidFill>
+                <a:srgbClr val="FF0000"/>
+              </a:solidFill>
+              <a:cs typeface="Lucida Sans Unicode" panose="020B0602030504020204" pitchFamily="34" charset="0"/>
+            </a:endParaRPr>
           </a:p>
           <a:p>
             <a:pPr lvl="1">
@@ -6148,10 +6202,22 @@
               </a:spcBef>
             </a:pPr>
             <a:r>
-              <a:rPr lang="en-US" sz="1400" dirty="0">
+              <a:rPr lang="en-US" sz="2000" dirty="0">
                 <a:cs typeface="Lucida Sans Unicode" panose="020B0602030504020204" pitchFamily="34" charset="0"/>
               </a:rPr>
-              <a:t>Search icon or dropdown option</a:t>
+              <a:t>“Artist info card": </a:t>
+            </a:r>
+            <a:r>
+              <a:rPr lang="en-US" sz="2000" b="1" dirty="0">
+                <a:cs typeface="Lucida Sans Unicode" panose="020B0602030504020204" pitchFamily="34" charset="0"/>
+              </a:rPr>
+              <a:t>Info Grid</a:t>
+            </a:r>
+            <a:r>
+              <a:rPr lang="en-US" sz="2000" dirty="0">
+                <a:cs typeface="Lucida Sans Unicode" panose="020B0602030504020204" pitchFamily="34" charset="0"/>
+              </a:rPr>
+              <a:t> of the selected Artist that contains: Name, Type of Artist &amp; Followers</a:t>
             </a:r>
           </a:p>
           <a:p>
@@ -6161,10 +6227,100 @@
               </a:spcBef>
             </a:pPr>
             <a:r>
-              <a:rPr lang="en-US" sz="1400" dirty="0">
+              <a:rPr lang="en-US" sz="2000" dirty="0">
                 <a:cs typeface="Lucida Sans Unicode" panose="020B0602030504020204" pitchFamily="34" charset="0"/>
               </a:rPr>
-              <a:t>Spotify API</a:t>
+              <a:t>“Billboard hits 1999 to 2019": </a:t>
+            </a:r>
+            <a:r>
+              <a:rPr lang="en-US" sz="2000" b="1" dirty="0">
+                <a:cs typeface="Lucida Sans Unicode" panose="020B0602030504020204" pitchFamily="34" charset="0"/>
+              </a:rPr>
+              <a:t>Bar graph </a:t>
+            </a:r>
+            <a:r>
+              <a:rPr lang="en-US" sz="2000" dirty="0">
+                <a:cs typeface="Lucida Sans Unicode" panose="020B0602030504020204" pitchFamily="34" charset="0"/>
+              </a:rPr>
+              <a:t>of how frequently the selected artist featured in Top 100 over the past 20 years</a:t>
+            </a:r>
+          </a:p>
+          <a:p>
+            <a:pPr lvl="1">
+              <a:spcBef>
+                <a:spcPts val="0"/>
+              </a:spcBef>
+            </a:pPr>
+            <a:r>
+              <a:rPr lang="en-US" sz="2000" dirty="0">
+                <a:cs typeface="Lucida Sans Unicode" panose="020B0602030504020204" pitchFamily="34" charset="0"/>
+              </a:rPr>
+              <a:t>"Albums &amp; Genres": </a:t>
+            </a:r>
+            <a:r>
+              <a:rPr lang="en-US" sz="2000" b="1" dirty="0">
+                <a:cs typeface="Lucida Sans Unicode" panose="020B0602030504020204" pitchFamily="34" charset="0"/>
+              </a:rPr>
+              <a:t>Info Grid</a:t>
+            </a:r>
+            <a:r>
+              <a:rPr lang="en-US" sz="2000" dirty="0">
+                <a:cs typeface="Lucida Sans Unicode" panose="020B0602030504020204" pitchFamily="34" charset="0"/>
+              </a:rPr>
+              <a:t> of the selected Artist that contains: First album release year, Number of Albums &amp; Genre</a:t>
+            </a:r>
+          </a:p>
+          <a:p>
+            <a:pPr lvl="1">
+              <a:spcBef>
+                <a:spcPts val="0"/>
+              </a:spcBef>
+            </a:pPr>
+            <a:r>
+              <a:rPr lang="en-US" sz="2000" dirty="0">
+                <a:cs typeface="Lucida Sans Unicode" panose="020B0602030504020204" pitchFamily="34" charset="0"/>
+              </a:rPr>
+              <a:t>“Artist Word Cloud”: </a:t>
+            </a:r>
+            <a:r>
+              <a:rPr lang="en-US" sz="2000" b="1" dirty="0">
+                <a:cs typeface="Lucida Sans Unicode" panose="020B0602030504020204" pitchFamily="34" charset="0"/>
+              </a:rPr>
+              <a:t>Word cloud</a:t>
+            </a:r>
+            <a:r>
+              <a:rPr lang="en-US" sz="2000" dirty="0">
+                <a:cs typeface="Lucida Sans Unicode" panose="020B0602030504020204" pitchFamily="34" charset="0"/>
+              </a:rPr>
+              <a:t> of the selected Artist’s song lyrics</a:t>
+            </a:r>
+            <a:endParaRPr lang="en-US" sz="2000" b="1" dirty="0">
+              <a:cs typeface="Lucida Sans Unicode" panose="020B0602030504020204" pitchFamily="34" charset="0"/>
+            </a:endParaRPr>
+          </a:p>
+          <a:p>
+            <a:pPr lvl="1">
+              <a:spcBef>
+                <a:spcPts val="0"/>
+              </a:spcBef>
+            </a:pPr>
+            <a:r>
+              <a:rPr lang="en-US" sz="2000" dirty="0">
+                <a:cs typeface="Lucida Sans Unicode" panose="020B0602030504020204" pitchFamily="34" charset="0"/>
+              </a:rPr>
+              <a:t>“Song, Genre &amp; Top Rank”: </a:t>
+            </a:r>
+            <a:r>
+              <a:rPr lang="en-US" sz="2000" b="1" dirty="0">
+                <a:cs typeface="Lucida Sans Unicode" panose="020B0602030504020204" pitchFamily="34" charset="0"/>
+              </a:rPr>
+              <a:t>Table</a:t>
+            </a:r>
+            <a:r>
+              <a:rPr lang="en-US" sz="2000" dirty="0">
+                <a:cs typeface="Lucida Sans Unicode" panose="020B0602030504020204" pitchFamily="34" charset="0"/>
+              </a:rPr>
+              <a:t> of the selected Artist that contains: Song Name, Genre &amp; Top Rank of the song</a:t>
             </a:r>
           </a:p>
           <a:p>
@@ -6173,9 +6329,24 @@
                 <a:spcPts val="0"/>
               </a:spcBef>
             </a:pPr>
-            <a:endParaRPr lang="en-US" sz="1400" b="1" dirty="0">
-              <a:cs typeface="Lucida Sans Unicode" panose="020B0602030504020204" pitchFamily="34" charset="0"/>
-            </a:endParaRPr>
+            <a:r>
+              <a:rPr lang="en-US" sz="2000" dirty="0">
+                <a:cs typeface="Lucida Sans Unicode" panose="020B0602030504020204" pitchFamily="34" charset="0"/>
+              </a:rPr>
+              <a:t>“</a:t>
+            </a:r>
+            <a:r>
+              <a:rPr lang="en-US" sz="2000" b="1" dirty="0">
+                <a:cs typeface="Lucida Sans Unicode" panose="020B0602030504020204" pitchFamily="34" charset="0"/>
+              </a:rPr>
+              <a:t>Team Profiles</a:t>
+            </a:r>
+            <a:r>
+              <a:rPr lang="en-US" sz="2000" dirty="0">
+                <a:cs typeface="Lucida Sans Unicode" panose="020B0602030504020204" pitchFamily="34" charset="0"/>
+              </a:rPr>
+              <a:t>”: Links to GitHub &amp; LinkedIn profiles of each team member</a:t>
+            </a:r>
           </a:p>
           <a:p>
             <a:pPr>
@@ -6184,227 +6355,22 @@
               </a:spcBef>
             </a:pPr>
             <a:r>
-              <a:rPr lang="en-US" sz="1400" b="1" dirty="0">
+              <a:rPr lang="en-US" sz="2000" dirty="0">
                 <a:cs typeface="Lucida Sans Unicode" panose="020B0602030504020204" pitchFamily="34" charset="0"/>
               </a:rPr>
-              <a:t>DASHBOARD LAYOUT </a:t>
-            </a:r>
-            <a:r>
-              <a:rPr lang="en-US" sz="1400" dirty="0">
+              <a:t>“</a:t>
+            </a:r>
+            <a:r>
+              <a:rPr lang="en-US" sz="2000" b="1" dirty="0">
                 <a:cs typeface="Lucida Sans Unicode" panose="020B0602030504020204" pitchFamily="34" charset="0"/>
               </a:rPr>
-              <a:t>using </a:t>
-            </a:r>
-            <a:r>
-              <a:rPr lang="en-US" sz="1400" dirty="0">
-                <a:solidFill>
-                  <a:srgbClr val="0000FF"/>
-                </a:solidFill>
+              <a:t>Tableau visualization</a:t>
+            </a:r>
+            <a:r>
+              <a:rPr lang="en-US" sz="2000" dirty="0">
                 <a:cs typeface="Lucida Sans Unicode" panose="020B0602030504020204" pitchFamily="34" charset="0"/>
               </a:rPr>
-              <a:t>JS </a:t>
-            </a:r>
-            <a:r>
-              <a:rPr lang="en-US" sz="1400" dirty="0" err="1">
-                <a:solidFill>
-                  <a:srgbClr val="0000FF"/>
-                </a:solidFill>
-                <a:cs typeface="Lucida Sans Unicode" panose="020B0602030504020204" pitchFamily="34" charset="0"/>
-              </a:rPr>
-              <a:t>D3</a:t>
-            </a:r>
-            <a:r>
-              <a:rPr lang="en-US" sz="1400" dirty="0">
-                <a:cs typeface="Lucida Sans Unicode" panose="020B0602030504020204" pitchFamily="34" charset="0"/>
-              </a:rPr>
-              <a:t>:</a:t>
-            </a:r>
-          </a:p>
-          <a:p>
-            <a:pPr lvl="1">
-              <a:spcBef>
-                <a:spcPts val="0"/>
-              </a:spcBef>
-            </a:pPr>
-            <a:r>
-              <a:rPr lang="en-US" sz="1400" dirty="0">
-                <a:cs typeface="Lucida Sans Unicode" panose="020B0602030504020204" pitchFamily="34" charset="0"/>
-              </a:rPr>
-              <a:t>"Performance" – </a:t>
-            </a:r>
-            <a:r>
-              <a:rPr lang="en-US" sz="1400" b="1" dirty="0">
-                <a:cs typeface="Lucida Sans Unicode" panose="020B0602030504020204" pitchFamily="34" charset="0"/>
-              </a:rPr>
-              <a:t>Line graph </a:t>
-            </a:r>
-            <a:r>
-              <a:rPr lang="en-US" sz="1400" dirty="0">
-                <a:cs typeface="Lucida Sans Unicode" panose="020B0602030504020204" pitchFamily="34" charset="0"/>
-              </a:rPr>
-              <a:t>of the average attributes by the selected Artist</a:t>
-            </a:r>
-            <a:endParaRPr lang="en-US" sz="1400" dirty="0">
-              <a:solidFill>
-                <a:srgbClr val="FF0000"/>
-              </a:solidFill>
-              <a:cs typeface="Lucida Sans Unicode" panose="020B0602030504020204" pitchFamily="34" charset="0"/>
-            </a:endParaRPr>
-          </a:p>
-          <a:p>
-            <a:pPr lvl="2">
-              <a:spcBef>
-                <a:spcPts val="0"/>
-              </a:spcBef>
-            </a:pPr>
-            <a:r>
-              <a:rPr lang="en-US" sz="1400" dirty="0">
-                <a:cs typeface="Lucida Sans Unicode" panose="020B0602030504020204" pitchFamily="34" charset="0"/>
-              </a:rPr>
-              <a:t>Make a boolean of the song duration</a:t>
-            </a:r>
-          </a:p>
-          <a:p>
-            <a:pPr lvl="1">
-              <a:spcBef>
-                <a:spcPts val="0"/>
-              </a:spcBef>
-            </a:pPr>
-            <a:r>
-              <a:rPr lang="en-US" sz="1400" dirty="0">
-                <a:cs typeface="Lucida Sans Unicode" panose="020B0602030504020204" pitchFamily="34" charset="0"/>
-              </a:rPr>
-              <a:t>"Total shipments": </a:t>
-            </a:r>
-            <a:r>
-              <a:rPr lang="en-US" sz="1400" b="1" dirty="0">
-                <a:cs typeface="Lucida Sans Unicode" panose="020B0602030504020204" pitchFamily="34" charset="0"/>
-              </a:rPr>
-              <a:t>Info Grid</a:t>
-            </a:r>
-            <a:r>
-              <a:rPr lang="en-US" sz="1400" dirty="0">
-                <a:cs typeface="Lucida Sans Unicode" panose="020B0602030504020204" pitchFamily="34" charset="0"/>
-              </a:rPr>
-              <a:t> of the selected Artist that contains: Name, First album name &amp; year, Followers</a:t>
-            </a:r>
-          </a:p>
-          <a:p>
-            <a:pPr lvl="1">
-              <a:spcBef>
-                <a:spcPts val="0"/>
-              </a:spcBef>
-            </a:pPr>
-            <a:r>
-              <a:rPr lang="en-US" sz="1400" dirty="0">
-                <a:cs typeface="Lucida Sans Unicode" panose="020B0602030504020204" pitchFamily="34" charset="0"/>
-              </a:rPr>
-              <a:t>“Daily sales": Last 6-year </a:t>
-            </a:r>
-            <a:r>
-              <a:rPr lang="en-US" sz="1400" b="1" dirty="0">
-                <a:cs typeface="Lucida Sans Unicode" panose="020B0602030504020204" pitchFamily="34" charset="0"/>
-              </a:rPr>
-              <a:t>Bar graph </a:t>
-            </a:r>
-            <a:r>
-              <a:rPr lang="en-US" sz="1400" dirty="0">
-                <a:cs typeface="Lucida Sans Unicode" panose="020B0602030504020204" pitchFamily="34" charset="0"/>
-              </a:rPr>
-              <a:t>of how frequently the selected artist featured in Top 100</a:t>
-            </a:r>
-          </a:p>
-          <a:p>
-            <a:pPr lvl="1">
-              <a:spcBef>
-                <a:spcPts val="0"/>
-              </a:spcBef>
-            </a:pPr>
-            <a:r>
-              <a:rPr lang="en-US" sz="1400" dirty="0">
-                <a:cs typeface="Lucida Sans Unicode" panose="020B0602030504020204" pitchFamily="34" charset="0"/>
-              </a:rPr>
-              <a:t>"Completed tasks": </a:t>
-            </a:r>
-            <a:r>
-              <a:rPr lang="en-US" sz="1400" b="1" dirty="0">
-                <a:solidFill>
-                  <a:srgbClr val="FF0000"/>
-                </a:solidFill>
-                <a:cs typeface="Lucida Sans Unicode" panose="020B0602030504020204" pitchFamily="34" charset="0"/>
-              </a:rPr>
-              <a:t>BONUS</a:t>
-            </a:r>
-            <a:r>
-              <a:rPr lang="en-US" sz="1400" dirty="0">
-                <a:cs typeface="Lucida Sans Unicode" panose="020B0602030504020204" pitchFamily="34" charset="0"/>
-              </a:rPr>
-              <a:t> </a:t>
-            </a:r>
-            <a:r>
-              <a:rPr lang="en-US" sz="1400" b="1" dirty="0">
-                <a:cs typeface="Lucida Sans Unicode" panose="020B0602030504020204" pitchFamily="34" charset="0"/>
-              </a:rPr>
-              <a:t>Spotify API </a:t>
-            </a:r>
-            <a:r>
-              <a:rPr lang="en-US" sz="1400" dirty="0">
-                <a:cs typeface="Lucida Sans Unicode" panose="020B0602030504020204" pitchFamily="34" charset="0"/>
-              </a:rPr>
-              <a:t>for the current top song of the artist</a:t>
-            </a:r>
-          </a:p>
-          <a:p>
-            <a:pPr lvl="1">
-              <a:spcBef>
-                <a:spcPts val="0"/>
-              </a:spcBef>
-            </a:pPr>
-            <a:r>
-              <a:rPr lang="en-US" sz="1400" dirty="0">
-                <a:cs typeface="Lucida Sans Unicode" panose="020B0602030504020204" pitchFamily="34" charset="0"/>
-              </a:rPr>
-              <a:t>“Tasks”: </a:t>
-            </a:r>
-            <a:r>
-              <a:rPr lang="en-US" sz="1400" b="1" dirty="0">
-                <a:cs typeface="Lucida Sans Unicode" panose="020B0602030504020204" pitchFamily="34" charset="0"/>
-              </a:rPr>
-              <a:t>Word cloud</a:t>
-            </a:r>
-            <a:r>
-              <a:rPr lang="en-US" sz="1400" dirty="0">
-                <a:cs typeface="Lucida Sans Unicode" panose="020B0602030504020204" pitchFamily="34" charset="0"/>
-              </a:rPr>
-              <a:t> of the selected Artist’s songs</a:t>
-            </a:r>
-            <a:endParaRPr lang="en-US" sz="1400" b="1" dirty="0">
-              <a:cs typeface="Lucida Sans Unicode" panose="020B0602030504020204" pitchFamily="34" charset="0"/>
-            </a:endParaRPr>
-          </a:p>
-          <a:p>
-            <a:pPr lvl="1">
-              <a:spcBef>
-                <a:spcPts val="0"/>
-              </a:spcBef>
-            </a:pPr>
-            <a:r>
-              <a:rPr lang="en-US" sz="1400" dirty="0">
-                <a:cs typeface="Lucida Sans Unicode" panose="020B0602030504020204" pitchFamily="34" charset="0"/>
-              </a:rPr>
-              <a:t>“Simple table”: </a:t>
-            </a:r>
-            <a:r>
-              <a:rPr lang="en-US" sz="1400" b="1" dirty="0">
-                <a:cs typeface="Lucida Sans Unicode" panose="020B0602030504020204" pitchFamily="34" charset="0"/>
-              </a:rPr>
-              <a:t>Table</a:t>
-            </a:r>
-            <a:r>
-              <a:rPr lang="en-US" sz="1400" dirty="0">
-                <a:cs typeface="Lucida Sans Unicode" panose="020B0602030504020204" pitchFamily="34" charset="0"/>
-              </a:rPr>
-              <a:t> of the selected Artist’s songs and albums</a:t>
+              <a:t>”: Running bar chart of the top artist timeline</a:t>
             </a:r>
           </a:p>
           <a:p>
@@ -6414,22 +6380,22 @@
               </a:spcBef>
             </a:pPr>
             <a:r>
-              <a:rPr lang="en-US" sz="1400" dirty="0">
+              <a:rPr lang="en-US" sz="2000" dirty="0">
                 <a:cs typeface="Lucida Sans Unicode" panose="020B0602030504020204" pitchFamily="34" charset="0"/>
               </a:rPr>
               <a:t>“</a:t>
             </a:r>
             <a:r>
-              <a:rPr lang="en-US" sz="1400" b="1" dirty="0">
+              <a:rPr lang="en-US" sz="2000" b="1" dirty="0">
                 <a:cs typeface="Lucida Sans Unicode" panose="020B0602030504020204" pitchFamily="34" charset="0"/>
               </a:rPr>
-              <a:t>ICONS</a:t>
-            </a:r>
-            <a:r>
-              <a:rPr lang="en-US" sz="1400" dirty="0">
+              <a:t>Timeline &amp; Definition</a:t>
+            </a:r>
+            <a:r>
+              <a:rPr lang="en-US" sz="2000" dirty="0">
                 <a:cs typeface="Lucida Sans Unicode" panose="020B0602030504020204" pitchFamily="34" charset="0"/>
               </a:rPr>
-              <a:t>”: Same as previous project profiles</a:t>
+              <a:t>”: The final countdown/overview of each day’s milestone &amp; Definitions of each attribute</a:t>
             </a:r>
           </a:p>
           <a:p>
@@ -6439,37 +6405,22 @@
               </a:spcBef>
             </a:pPr>
             <a:r>
-              <a:rPr lang="en-US" sz="1400" dirty="0">
+              <a:rPr lang="en-US" sz="2000" dirty="0">
                 <a:cs typeface="Lucida Sans Unicode" panose="020B0602030504020204" pitchFamily="34" charset="0"/>
               </a:rPr>
               <a:t>“</a:t>
             </a:r>
             <a:r>
-              <a:rPr lang="en-US" sz="1400" b="1" dirty="0">
+              <a:rPr lang="en-US" sz="2000" b="1" dirty="0">
                 <a:cs typeface="Lucida Sans Unicode" panose="020B0602030504020204" pitchFamily="34" charset="0"/>
               </a:rPr>
-              <a:t>MAPS</a:t>
-            </a:r>
-            <a:r>
-              <a:rPr lang="en-US" sz="1400" dirty="0">
+              <a:t>Machine Learning</a:t>
+            </a:r>
+            <a:r>
+              <a:rPr lang="en-US" sz="2000" dirty="0">
                 <a:cs typeface="Lucida Sans Unicode" panose="020B0602030504020204" pitchFamily="34" charset="0"/>
               </a:rPr>
-              <a:t>”: </a:t>
-            </a:r>
-            <a:r>
-              <a:rPr lang="en-US" sz="1400" dirty="0">
-                <a:solidFill>
-                  <a:srgbClr val="0000FF"/>
-                </a:solidFill>
-                <a:cs typeface="Lucida Sans Unicode" panose="020B0602030504020204" pitchFamily="34" charset="0"/>
-              </a:rPr>
-              <a:t>Tableau</a:t>
-            </a:r>
-            <a:r>
-              <a:rPr lang="en-US" sz="1400" dirty="0">
-                <a:cs typeface="Lucida Sans Unicode" panose="020B0602030504020204" pitchFamily="34" charset="0"/>
-              </a:rPr>
-              <a:t> timeline animation</a:t>
+              <a:t>”: Machine Learning with test results</a:t>
             </a:r>
           </a:p>
           <a:p>
@@ -6479,22 +6430,22 @@
               </a:spcBef>
             </a:pPr>
             <a:r>
-              <a:rPr lang="en-US" sz="1400" dirty="0">
+              <a:rPr lang="en-US" sz="2000" dirty="0">
                 <a:cs typeface="Lucida Sans Unicode" panose="020B0602030504020204" pitchFamily="34" charset="0"/>
               </a:rPr>
               <a:t>“</a:t>
             </a:r>
             <a:r>
-              <a:rPr lang="en-US" sz="1400" b="1" dirty="0">
+              <a:rPr lang="en-US" sz="2000" b="1" dirty="0">
                 <a:cs typeface="Lucida Sans Unicode" panose="020B0602030504020204" pitchFamily="34" charset="0"/>
               </a:rPr>
-              <a:t>NOTIFICATIONS</a:t>
-            </a:r>
-            <a:r>
-              <a:rPr lang="en-US" sz="1400" dirty="0">
+              <a:t>Billboard Data</a:t>
+            </a:r>
+            <a:r>
+              <a:rPr lang="en-US" sz="2000" dirty="0">
                 <a:cs typeface="Lucida Sans Unicode" panose="020B0602030504020204" pitchFamily="34" charset="0"/>
               </a:rPr>
-              <a:t>”: TBD</a:t>
+              <a:t>”: Raw data tables containing: Top 5 Solo/Group Artists, Song Attributes &amp; Genres</a:t>
             </a:r>
           </a:p>
           <a:p>
@@ -6504,197 +6455,22 @@
               </a:spcBef>
             </a:pPr>
             <a:r>
-              <a:rPr lang="en-US" sz="1400" dirty="0">
+              <a:rPr lang="en-US" sz="2000" dirty="0">
                 <a:cs typeface="Lucida Sans Unicode" panose="020B0602030504020204" pitchFamily="34" charset="0"/>
               </a:rPr>
               <a:t>“</a:t>
             </a:r>
             <a:r>
-              <a:rPr lang="en-US" sz="1400" b="1" dirty="0">
+              <a:rPr lang="en-US" sz="2000" b="1" dirty="0">
                 <a:cs typeface="Lucida Sans Unicode" panose="020B0602030504020204" pitchFamily="34" charset="0"/>
               </a:rPr>
-              <a:t>USER PROFILE</a:t>
-            </a:r>
-            <a:r>
-              <a:rPr lang="en-US" sz="1400" dirty="0">
+              <a:t>Project Summary</a:t>
+            </a:r>
+            <a:r>
+              <a:rPr lang="en-US" sz="2000" dirty="0">
                 <a:cs typeface="Lucida Sans Unicode" panose="020B0602030504020204" pitchFamily="34" charset="0"/>
               </a:rPr>
-              <a:t>”: Machine Learning with test results</a:t>
-            </a:r>
-          </a:p>
-          <a:p>
-            <a:pPr>
-              <a:spcBef>
-                <a:spcPts val="0"/>
-              </a:spcBef>
-            </a:pPr>
-            <a:r>
-              <a:rPr lang="en-US" sz="1400" dirty="0">
-                <a:cs typeface="Lucida Sans Unicode" panose="020B0602030504020204" pitchFamily="34" charset="0"/>
-              </a:rPr>
-              <a:t>“</a:t>
-            </a:r>
-            <a:r>
-              <a:rPr lang="en-US" sz="1400" b="1" dirty="0">
-                <a:cs typeface="Lucida Sans Unicode" panose="020B0602030504020204" pitchFamily="34" charset="0"/>
-              </a:rPr>
-              <a:t>TABLE LIST</a:t>
-            </a:r>
-            <a:r>
-              <a:rPr lang="en-US" sz="1400" dirty="0">
-                <a:cs typeface="Lucida Sans Unicode" panose="020B0602030504020204" pitchFamily="34" charset="0"/>
-              </a:rPr>
-              <a:t>”: Raw data table containing: Artist name, First Album Release Year, Followers</a:t>
-            </a:r>
-          </a:p>
-          <a:p>
-            <a:pPr>
-              <a:spcBef>
-                <a:spcPts val="0"/>
-              </a:spcBef>
-            </a:pPr>
-            <a:r>
-              <a:rPr lang="en-US" sz="1400" dirty="0">
-                <a:cs typeface="Lucida Sans Unicode" panose="020B0602030504020204" pitchFamily="34" charset="0"/>
-              </a:rPr>
-              <a:t>“</a:t>
-            </a:r>
-            <a:r>
-              <a:rPr lang="en-US" sz="1400" b="1" dirty="0">
-                <a:cs typeface="Lucida Sans Unicode" panose="020B0602030504020204" pitchFamily="34" charset="0"/>
-              </a:rPr>
-              <a:t>TYPOGRAPHY</a:t>
-            </a:r>
-            <a:r>
-              <a:rPr lang="en-US" sz="1400" dirty="0">
-                <a:cs typeface="Lucida Sans Unicode" panose="020B0602030504020204" pitchFamily="34" charset="0"/>
-              </a:rPr>
-              <a:t>”: Write up of project summary and findings</a:t>
-            </a:r>
-          </a:p>
-          <a:p>
-            <a:pPr>
-              <a:spcBef>
-                <a:spcPts val="0"/>
-              </a:spcBef>
-            </a:pPr>
-            <a:r>
-              <a:rPr lang="en-US" sz="1400" dirty="0">
-                <a:cs typeface="Lucida Sans Unicode" panose="020B0602030504020204" pitchFamily="34" charset="0"/>
-              </a:rPr>
-              <a:t>“</a:t>
-            </a:r>
-            <a:r>
-              <a:rPr lang="en-US" sz="1400" b="1" dirty="0">
-                <a:cs typeface="Lucida Sans Unicode" panose="020B0602030504020204" pitchFamily="34" charset="0"/>
-              </a:rPr>
-              <a:t>RTL SUPPORT</a:t>
-            </a:r>
-            <a:r>
-              <a:rPr lang="en-US" sz="1400" dirty="0">
-                <a:cs typeface="Lucida Sans Unicode" panose="020B0602030504020204" pitchFamily="34" charset="0"/>
-              </a:rPr>
-              <a:t>”: Changes the alignment from R to L</a:t>
-            </a:r>
-          </a:p>
-          <a:p>
-            <a:pPr>
-              <a:spcBef>
-                <a:spcPts val="0"/>
-              </a:spcBef>
-            </a:pPr>
-            <a:endParaRPr lang="en-US" sz="1400" dirty="0">
-              <a:cs typeface="Lucida Sans Unicode" panose="020B0602030504020204" pitchFamily="34" charset="0"/>
-            </a:endParaRPr>
-          </a:p>
-          <a:p>
-            <a:pPr fontAlgn="t">
-              <a:spcBef>
-                <a:spcPts val="0"/>
-              </a:spcBef>
-            </a:pPr>
-            <a:r>
-              <a:rPr lang="en-US" sz="1400" dirty="0">
-                <a:cs typeface="Lucida Sans Unicode" panose="020B0602030504020204" pitchFamily="34" charset="0"/>
-              </a:rPr>
-              <a:t>Machine Learning overview:</a:t>
-            </a:r>
-          </a:p>
-          <a:p>
-            <a:pPr lvl="1" fontAlgn="t">
-              <a:spcBef>
-                <a:spcPts val="0"/>
-              </a:spcBef>
-            </a:pPr>
-            <a:r>
-              <a:rPr lang="en-US" sz="1400" dirty="0">
-                <a:cs typeface="Lucida Sans Unicode" panose="020B0602030504020204" pitchFamily="34" charset="0"/>
-              </a:rPr>
-              <a:t>Create a front-end interface that maps to an API to “smarten” the algorithm.</a:t>
-            </a:r>
-          </a:p>
-          <a:p>
-            <a:pPr lvl="1" fontAlgn="t">
-              <a:spcBef>
-                <a:spcPts val="0"/>
-              </a:spcBef>
-            </a:pPr>
-            <a:r>
-              <a:rPr lang="en-US" sz="1400" dirty="0">
-                <a:cs typeface="Lucida Sans Unicode" panose="020B0602030504020204" pitchFamily="34" charset="0"/>
-              </a:rPr>
-              <a:t>Perform a deep dive of existing data using machine learning.</a:t>
-            </a:r>
-          </a:p>
-          <a:p>
-            <a:pPr lvl="1" fontAlgn="t">
-              <a:spcBef>
-                <a:spcPts val="0"/>
-              </a:spcBef>
-            </a:pPr>
-            <a:r>
-              <a:rPr lang="en-US" sz="1400" dirty="0">
-                <a:cs typeface="Lucida Sans Unicode" panose="020B0602030504020204" pitchFamily="34" charset="0"/>
-              </a:rPr>
-              <a:t>Create a visualization that continues to learn where clusters lie based on ML. (Use </a:t>
-            </a:r>
-            <a:r>
-              <a:rPr lang="en-US" sz="1400" dirty="0" err="1">
-                <a:cs typeface="Lucida Sans Unicode" panose="020B0602030504020204" pitchFamily="34" charset="0"/>
-              </a:rPr>
-              <a:t>D3</a:t>
-            </a:r>
-            <a:r>
-              <a:rPr lang="en-US" sz="1400" dirty="0">
-                <a:cs typeface="Lucida Sans Unicode" panose="020B0602030504020204" pitchFamily="34" charset="0"/>
-              </a:rPr>
-              <a:t> or Plotly to change the visualization.)</a:t>
-            </a:r>
-          </a:p>
-          <a:p>
-            <a:pPr lvl="1" fontAlgn="t">
-              <a:spcBef>
-                <a:spcPts val="0"/>
-              </a:spcBef>
-            </a:pPr>
-            <a:r>
-              <a:rPr lang="en-US" sz="1400" dirty="0">
-                <a:cs typeface="Lucida Sans Unicode" panose="020B0602030504020204" pitchFamily="34" charset="0"/>
-              </a:rPr>
-              <a:t>Create an idea with mock data that simulates how machine learning might be used.</a:t>
-            </a:r>
-          </a:p>
-          <a:p>
-            <a:pPr lvl="1" fontAlgn="t">
-              <a:spcBef>
-                <a:spcPts val="0"/>
-              </a:spcBef>
-            </a:pPr>
-            <a:r>
-              <a:rPr lang="en-US" sz="1400" dirty="0">
-                <a:cs typeface="Lucida Sans Unicode" panose="020B0602030504020204" pitchFamily="34" charset="0"/>
-              </a:rPr>
-              <a:t>Create an analysis of existing data to make a prediction, classification, or regression.</a:t>
+              <a:t>”: Write up of project summary, findings &amp; APIs</a:t>
             </a:r>
           </a:p>
         </p:txBody>

</xml_diff>